<commit_message>
Ubah sedikit sblm seminar
</commit_message>
<xml_diff>
--- a/PPT.pptx
+++ b/PPT.pptx
@@ -31,15 +31,17 @@
     <p:sldId id="281" r:id="rId25"/>
     <p:sldId id="282" r:id="rId26"/>
     <p:sldId id="283" r:id="rId27"/>
-    <p:sldId id="284" r:id="rId28"/>
-    <p:sldId id="285" r:id="rId29"/>
-    <p:sldId id="286" r:id="rId30"/>
-    <p:sldId id="287" r:id="rId31"/>
-    <p:sldId id="288" r:id="rId32"/>
-    <p:sldId id="289" r:id="rId33"/>
-    <p:sldId id="290" r:id="rId34"/>
-    <p:sldId id="291" r:id="rId35"/>
-    <p:sldId id="292" r:id="rId36"/>
+    <p:sldId id="296" r:id="rId28"/>
+    <p:sldId id="284" r:id="rId29"/>
+    <p:sldId id="285" r:id="rId30"/>
+    <p:sldId id="286" r:id="rId31"/>
+    <p:sldId id="287" r:id="rId32"/>
+    <p:sldId id="288" r:id="rId33"/>
+    <p:sldId id="289" r:id="rId34"/>
+    <p:sldId id="290" r:id="rId35"/>
+    <p:sldId id="291" r:id="rId36"/>
+    <p:sldId id="292" r:id="rId37"/>
+    <p:sldId id="297" r:id="rId38"/>
   </p:sldIdLst>
   <p:sldSz cx="12192000" cy="6858000"/>
   <p:notesSz cx="6858000" cy="9144000"/>
@@ -169,6 +171,7 @@
             <p14:sldId id="281"/>
             <p14:sldId id="282"/>
             <p14:sldId id="283"/>
+            <p14:sldId id="296"/>
             <p14:sldId id="284"/>
             <p14:sldId id="285"/>
             <p14:sldId id="286"/>
@@ -178,6 +181,7 @@
             <p14:sldId id="290"/>
             <p14:sldId id="291"/>
             <p14:sldId id="292"/>
+            <p14:sldId id="297"/>
           </p14:sldIdLst>
         </p14:section>
         <p14:section name="Untitled Section" id="{B21C94AB-48B2-4224-A014-AB177703A17D}">
@@ -8985,7 +8989,7 @@
           <a:p>
             <a:fld id="{02731B77-74DD-435B-A53C-CA736FF2054E}" type="datetimeFigureOut">
               <a:rPr lang="en-US" smtClean="0"/>
-              <a:t>4/26/2018</a:t>
+              <a:t>4/29/2018</a:t>
             </a:fld>
             <a:endParaRPr lang="en-US"/>
           </a:p>
@@ -9192,7 +9196,7 @@
           <a:p>
             <a:fld id="{02731B77-74DD-435B-A53C-CA736FF2054E}" type="datetimeFigureOut">
               <a:rPr lang="en-US" smtClean="0"/>
-              <a:t>4/26/2018</a:t>
+              <a:t>4/29/2018</a:t>
             </a:fld>
             <a:endParaRPr lang="en-US"/>
           </a:p>
@@ -9372,7 +9376,7 @@
           <a:p>
             <a:fld id="{02731B77-74DD-435B-A53C-CA736FF2054E}" type="datetimeFigureOut">
               <a:rPr lang="en-US" smtClean="0"/>
-              <a:t>4/26/2018</a:t>
+              <a:t>4/29/2018</a:t>
             </a:fld>
             <a:endParaRPr lang="en-US"/>
           </a:p>
@@ -9577,7 +9581,7 @@
           <a:p>
             <a:fld id="{02731B77-74DD-435B-A53C-CA736FF2054E}" type="datetimeFigureOut">
               <a:rPr lang="en-US" smtClean="0"/>
-              <a:t>4/26/2018</a:t>
+              <a:t>4/29/2018</a:t>
             </a:fld>
             <a:endParaRPr lang="en-US"/>
           </a:p>
@@ -18475,7 +18479,7 @@
           <a:p>
             <a:fld id="{02731B77-74DD-435B-A53C-CA736FF2054E}" type="datetimeFigureOut">
               <a:rPr lang="en-US" smtClean="0"/>
-              <a:t>4/26/2018</a:t>
+              <a:t>4/29/2018</a:t>
             </a:fld>
             <a:endParaRPr lang="en-US"/>
           </a:p>
@@ -18749,7 +18753,7 @@
           <a:p>
             <a:fld id="{02731B77-74DD-435B-A53C-CA736FF2054E}" type="datetimeFigureOut">
               <a:rPr lang="en-US" smtClean="0"/>
-              <a:t>4/26/2018</a:t>
+              <a:t>4/29/2018</a:t>
             </a:fld>
             <a:endParaRPr lang="en-US"/>
           </a:p>
@@ -19147,7 +19151,7 @@
           <a:p>
             <a:fld id="{02731B77-74DD-435B-A53C-CA736FF2054E}" type="datetimeFigureOut">
               <a:rPr lang="en-US" smtClean="0"/>
-              <a:t>4/26/2018</a:t>
+              <a:t>4/29/2018</a:t>
             </a:fld>
             <a:endParaRPr lang="en-US"/>
           </a:p>
@@ -19265,7 +19269,7 @@
           <a:p>
             <a:fld id="{02731B77-74DD-435B-A53C-CA736FF2054E}" type="datetimeFigureOut">
               <a:rPr lang="en-US" smtClean="0"/>
-              <a:t>4/26/2018</a:t>
+              <a:t>4/29/2018</a:t>
             </a:fld>
             <a:endParaRPr lang="en-US"/>
           </a:p>
@@ -19360,7 +19364,7 @@
           <a:p>
             <a:fld id="{02731B77-74DD-435B-A53C-CA736FF2054E}" type="datetimeFigureOut">
               <a:rPr lang="en-US" smtClean="0"/>
-              <a:t>4/26/2018</a:t>
+              <a:t>4/29/2018</a:t>
             </a:fld>
             <a:endParaRPr lang="en-US"/>
           </a:p>
@@ -19650,7 +19654,7 @@
           <a:p>
             <a:fld id="{02731B77-74DD-435B-A53C-CA736FF2054E}" type="datetimeFigureOut">
               <a:rPr lang="en-US" smtClean="0"/>
-              <a:t>4/26/2018</a:t>
+              <a:t>4/29/2018</a:t>
             </a:fld>
             <a:endParaRPr lang="en-US"/>
           </a:p>
@@ -19930,7 +19934,7 @@
           <a:p>
             <a:fld id="{02731B77-74DD-435B-A53C-CA736FF2054E}" type="datetimeFigureOut">
               <a:rPr lang="en-US" smtClean="0"/>
-              <a:t>4/26/2018</a:t>
+              <a:t>4/29/2018</a:t>
             </a:fld>
             <a:endParaRPr lang="en-US"/>
           </a:p>
@@ -20180,7 +20184,7 @@
           <a:p>
             <a:fld id="{02731B77-74DD-435B-A53C-CA736FF2054E}" type="datetimeFigureOut">
               <a:rPr lang="en-US" smtClean="0"/>
-              <a:t>4/26/2018</a:t>
+              <a:t>4/29/2018</a:t>
             </a:fld>
             <a:endParaRPr lang="en-US"/>
           </a:p>
@@ -20700,15 +20704,15 @@
         </p:spPr>
         <p:txBody>
           <a:bodyPr>
-            <a:normAutofit fontScale="90000"/>
+            <a:noAutofit/>
           </a:bodyPr>
           <a:lstStyle/>
           <a:p>
             <a:r>
-              <a:rPr lang="en-US" dirty="0"/>
+              <a:rPr lang="en-US" sz="3200" dirty="0" smtClean="0"/>
               <a:t>PENERAPAN DAN PERBANDINGAN ARSITEKTUR MICROSERVICE TERHADAP ARSITEKTUR MONOLITIK PADA PERANGKAT LUNAK SISTEM INFORMASI MENEJEMEN RUMAH SAKIT</a:t>
             </a:r>
-            <a:endParaRPr lang="en-US" dirty="0"/>
+            <a:endParaRPr lang="en-US" sz="3200" dirty="0"/>
           </a:p>
         </p:txBody>
       </p:sp>
@@ -21130,14 +21134,14 @@
                 <a:gridCol w="2377282">
                   <a:extLst>
                     <a:ext uri="{9D8B030D-6E8A-4147-A177-3AD203B41FA5}">
-                      <a16:colId xmlns:a16="http://schemas.microsoft.com/office/drawing/2014/main" val="2905065532"/>
+                      <a16:colId xmlns="" xmlns:a16="http://schemas.microsoft.com/office/drawing/2014/main" val="2905065532"/>
                     </a:ext>
                   </a:extLst>
                 </a:gridCol>
                 <a:gridCol w="2377282">
                   <a:extLst>
                     <a:ext uri="{9D8B030D-6E8A-4147-A177-3AD203B41FA5}">
-                      <a16:colId xmlns:a16="http://schemas.microsoft.com/office/drawing/2014/main" val="3802736106"/>
+                      <a16:colId xmlns="" xmlns:a16="http://schemas.microsoft.com/office/drawing/2014/main" val="3802736106"/>
                     </a:ext>
                   </a:extLst>
                 </a:gridCol>
@@ -21173,7 +21177,7 @@
                 </a:tc>
                 <a:extLst>
                   <a:ext uri="{0D108BD9-81ED-4DB2-BD59-A6C34878D82A}">
-                    <a16:rowId xmlns:a16="http://schemas.microsoft.com/office/drawing/2014/main" val="3168152095"/>
+                    <a16:rowId xmlns="" xmlns:a16="http://schemas.microsoft.com/office/drawing/2014/main" val="3168152095"/>
                   </a:ext>
                 </a:extLst>
               </a:tr>
@@ -21403,7 +21407,7 @@
                 </a:tc>
                 <a:extLst>
                   <a:ext uri="{0D108BD9-81ED-4DB2-BD59-A6C34878D82A}">
-                    <a16:rowId xmlns:a16="http://schemas.microsoft.com/office/drawing/2014/main" val="2919232402"/>
+                    <a16:rowId xmlns="" xmlns:a16="http://schemas.microsoft.com/office/drawing/2014/main" val="2919232402"/>
                   </a:ext>
                 </a:extLst>
               </a:tr>
@@ -21589,11 +21593,7 @@
             </a:r>
             <a:r>
               <a:rPr lang="en-US" dirty="0" smtClean="0"/>
-              <a:t> </a:t>
-            </a:r>
-            <a:r>
-              <a:rPr lang="en-US" dirty="0" smtClean="0"/>
-              <a:t>data </a:t>
+              <a:t> data </a:t>
             </a:r>
             <a:endParaRPr lang="en-US" dirty="0"/>
           </a:p>
@@ -22275,8 +22275,64 @@
               <a:buChar char="•"/>
             </a:pPr>
             <a:r>
-              <a:rPr lang="en-US" i="1" dirty="0"/>
-              <a:t> </a:t>
+              <a:rPr lang="en-US" dirty="0"/>
+              <a:t> </a:t>
+            </a:r>
+            <a:r>
+              <a:rPr lang="en-US" dirty="0" err="1" smtClean="0"/>
+              <a:t>Terdapat</a:t>
+            </a:r>
+            <a:r>
+              <a:rPr lang="en-US" dirty="0" smtClean="0"/>
+              <a:t> 2 </a:t>
+            </a:r>
+            <a:r>
+              <a:rPr lang="en-US" dirty="0" err="1" smtClean="0"/>
+              <a:t>metode</a:t>
+            </a:r>
+            <a:r>
+              <a:rPr lang="en-US" dirty="0" smtClean="0"/>
+              <a:t> : </a:t>
+            </a:r>
+            <a:r>
+              <a:rPr lang="en-US" dirty="0" err="1" smtClean="0"/>
+              <a:t>Dekomposisi</a:t>
+            </a:r>
+            <a:r>
+              <a:rPr lang="en-US" dirty="0" smtClean="0"/>
+              <a:t> </a:t>
+            </a:r>
+            <a:r>
+              <a:rPr lang="en-US" dirty="0" err="1" smtClean="0"/>
+              <a:t>berdasarkan</a:t>
+            </a:r>
+            <a:r>
+              <a:rPr lang="en-US" dirty="0" smtClean="0"/>
+              <a:t> subdomain &amp; </a:t>
+            </a:r>
+            <a:r>
+              <a:rPr lang="en-US" dirty="0" err="1" smtClean="0"/>
+              <a:t>dekomposisi</a:t>
+            </a:r>
+            <a:r>
+              <a:rPr lang="en-US" dirty="0" smtClean="0"/>
+              <a:t> </a:t>
+            </a:r>
+            <a:r>
+              <a:rPr lang="en-US" dirty="0" err="1" smtClean="0"/>
+              <a:t>berdasarkan</a:t>
+            </a:r>
+            <a:r>
+              <a:rPr lang="en-US" dirty="0" smtClean="0"/>
+              <a:t> proses </a:t>
+            </a:r>
+            <a:r>
+              <a:rPr lang="en-US" dirty="0" err="1" smtClean="0"/>
+              <a:t>bisnis</a:t>
+            </a:r>
+            <a:r>
+              <a:rPr lang="en-US" dirty="0" smtClean="0"/>
+              <a:t>.</a:t>
             </a:r>
             <a:endParaRPr lang="en-US" dirty="0"/>
           </a:p>
@@ -22353,7 +22409,7 @@
             <p:ph idx="1"/>
             <p:extLst>
               <p:ext uri="{D42A27DB-BD31-4B8C-83A1-F6EECF244321}">
-                <p14:modId xmlns:p14="http://schemas.microsoft.com/office/powerpoint/2010/main" val="2604744258"/>
+                <p14:modId xmlns:p14="http://schemas.microsoft.com/office/powerpoint/2010/main" val="2569069173"/>
               </p:ext>
             </p:extLst>
           </p:nvPr>
@@ -22372,14 +22428,14 @@
                 <a:gridCol w="4860131">
                   <a:extLst>
                     <a:ext uri="{9D8B030D-6E8A-4147-A177-3AD203B41FA5}">
-                      <a16:colId xmlns:a16="http://schemas.microsoft.com/office/drawing/2014/main" val="239280373"/>
+                      <a16:colId xmlns="" xmlns:a16="http://schemas.microsoft.com/office/drawing/2014/main" val="239280373"/>
                     </a:ext>
                   </a:extLst>
                 </a:gridCol>
                 <a:gridCol w="4860131">
                   <a:extLst>
                     <a:ext uri="{9D8B030D-6E8A-4147-A177-3AD203B41FA5}">
-                      <a16:colId xmlns:a16="http://schemas.microsoft.com/office/drawing/2014/main" val="3475585816"/>
+                      <a16:colId xmlns="" xmlns:a16="http://schemas.microsoft.com/office/drawing/2014/main" val="3475585816"/>
                     </a:ext>
                   </a:extLst>
                 </a:gridCol>
@@ -22431,7 +22487,7 @@
                 </a:tc>
                 <a:extLst>
                   <a:ext uri="{0D108BD9-81ED-4DB2-BD59-A6C34878D82A}">
-                    <a16:rowId xmlns:a16="http://schemas.microsoft.com/office/drawing/2014/main" val="923669991"/>
+                    <a16:rowId xmlns="" xmlns:a16="http://schemas.microsoft.com/office/drawing/2014/main" val="923669991"/>
                   </a:ext>
                 </a:extLst>
               </a:tr>
@@ -22475,7 +22531,7 @@
                       </a:r>
                       <a:r>
                         <a:rPr lang="en-US" i="1" baseline="0" dirty="0" smtClean="0"/>
-                        <a:t>domain-driven-design</a:t>
+                        <a:t>domain-driven-design / subdomain.</a:t>
                       </a:r>
                       <a:endParaRPr lang="en-US" dirty="0"/>
                     </a:p>
@@ -22489,7 +22545,15 @@
                     <a:p>
                       <a:r>
                         <a:rPr lang="en-US" dirty="0" err="1" smtClean="0"/>
-                        <a:t>Cocokapabila</a:t>
+                        <a:t>Cocok</a:t>
+                      </a:r>
+                      <a:r>
+                        <a:rPr lang="en-US" dirty="0" smtClean="0"/>
+                        <a:t> </a:t>
+                      </a:r>
+                      <a:r>
+                        <a:rPr lang="en-US" dirty="0" err="1" smtClean="0"/>
+                        <a:t>apabila</a:t>
                       </a:r>
                       <a:r>
                         <a:rPr lang="en-US" dirty="0" smtClean="0"/>
@@ -22546,7 +22610,7 @@
                 </a:tc>
                 <a:extLst>
                   <a:ext uri="{0D108BD9-81ED-4DB2-BD59-A6C34878D82A}">
-                    <a16:rowId xmlns:a16="http://schemas.microsoft.com/office/drawing/2014/main" val="1000297399"/>
+                    <a16:rowId xmlns="" xmlns:a16="http://schemas.microsoft.com/office/drawing/2014/main" val="1000297399"/>
                   </a:ext>
                 </a:extLst>
               </a:tr>
@@ -22622,6 +22686,180 @@
           <a:bodyPr/>
           <a:lstStyle/>
           <a:p>
+            <a:pPr>
+              <a:buFont typeface="Arial" panose="020B0604020202020204" pitchFamily="34" charset="0"/>
+              <a:buChar char="•"/>
+            </a:pPr>
+            <a:r>
+              <a:rPr lang="en-US" dirty="0"/>
+              <a:t> </a:t>
+            </a:r>
+            <a:r>
+              <a:rPr lang="en-US" dirty="0" err="1" smtClean="0"/>
+              <a:t>Setelah</a:t>
+            </a:r>
+            <a:r>
+              <a:rPr lang="en-US" dirty="0" smtClean="0"/>
+              <a:t> </a:t>
+            </a:r>
+            <a:r>
+              <a:rPr lang="en-US" dirty="0" err="1" smtClean="0"/>
+              <a:t>mengidentifikasi</a:t>
+            </a:r>
+            <a:r>
+              <a:rPr lang="en-US" dirty="0" smtClean="0"/>
+              <a:t> </a:t>
+            </a:r>
+            <a:r>
+              <a:rPr lang="en-US" dirty="0" err="1" smtClean="0"/>
+              <a:t>dan</a:t>
+            </a:r>
+            <a:r>
+              <a:rPr lang="en-US" dirty="0" smtClean="0"/>
+              <a:t> </a:t>
+            </a:r>
+            <a:r>
+              <a:rPr lang="en-US" dirty="0" err="1" smtClean="0"/>
+              <a:t>membentuk</a:t>
+            </a:r>
+            <a:r>
+              <a:rPr lang="en-US" dirty="0" smtClean="0"/>
+              <a:t> service, </a:t>
+            </a:r>
+            <a:r>
+              <a:rPr lang="en-US" dirty="0" err="1" smtClean="0"/>
+              <a:t>tahap</a:t>
+            </a:r>
+            <a:r>
+              <a:rPr lang="en-US" dirty="0" smtClean="0"/>
+              <a:t> </a:t>
+            </a:r>
+            <a:r>
+              <a:rPr lang="en-US" dirty="0" err="1" smtClean="0"/>
+              <a:t>selanjutnya</a:t>
+            </a:r>
+            <a:r>
+              <a:rPr lang="en-US" dirty="0" smtClean="0"/>
+              <a:t> </a:t>
+            </a:r>
+            <a:r>
+              <a:rPr lang="en-US" dirty="0" err="1" smtClean="0"/>
+              <a:t>adalah</a:t>
+            </a:r>
+            <a:r>
+              <a:rPr lang="en-US" dirty="0" smtClean="0"/>
+              <a:t> </a:t>
+            </a:r>
+            <a:r>
+              <a:rPr lang="en-US" dirty="0" err="1" smtClean="0"/>
+              <a:t>melakukan</a:t>
+            </a:r>
+            <a:r>
+              <a:rPr lang="en-US" dirty="0" smtClean="0"/>
+              <a:t> </a:t>
+            </a:r>
+            <a:r>
+              <a:rPr lang="en-US" i="1" dirty="0" smtClean="0"/>
+              <a:t>deployment </a:t>
+            </a:r>
+            <a:r>
+              <a:rPr lang="en-US" dirty="0" err="1" smtClean="0"/>
+              <a:t>dari</a:t>
+            </a:r>
+            <a:r>
+              <a:rPr lang="en-US" dirty="0" smtClean="0"/>
+              <a:t> service.</a:t>
+            </a:r>
+          </a:p>
+          <a:p>
+            <a:pPr>
+              <a:buFont typeface="Arial" panose="020B0604020202020204" pitchFamily="34" charset="0"/>
+              <a:buChar char="•"/>
+            </a:pPr>
+            <a:r>
+              <a:rPr lang="en-US" dirty="0" smtClean="0"/>
+              <a:t> </a:t>
+            </a:r>
+            <a:r>
+              <a:rPr lang="en-US" dirty="0" err="1" smtClean="0"/>
+              <a:t>Terdapat</a:t>
+            </a:r>
+            <a:r>
+              <a:rPr lang="en-US" dirty="0" smtClean="0"/>
+              <a:t> </a:t>
+            </a:r>
+            <a:r>
+              <a:rPr lang="en-US" dirty="0" err="1" smtClean="0"/>
+              <a:t>bebrapa</a:t>
+            </a:r>
+            <a:r>
+              <a:rPr lang="en-US" dirty="0" smtClean="0"/>
+              <a:t> </a:t>
+            </a:r>
+            <a:r>
+              <a:rPr lang="en-US" dirty="0" err="1" smtClean="0"/>
+              <a:t>metode</a:t>
+            </a:r>
+            <a:r>
+              <a:rPr lang="en-US" dirty="0" smtClean="0"/>
+              <a:t> deployment yang </a:t>
+            </a:r>
+            <a:r>
+              <a:rPr lang="en-US" dirty="0" err="1" smtClean="0"/>
+              <a:t>dapat</a:t>
+            </a:r>
+            <a:r>
+              <a:rPr lang="en-US" dirty="0" smtClean="0"/>
+              <a:t> </a:t>
+            </a:r>
+            <a:r>
+              <a:rPr lang="en-US" dirty="0" err="1" smtClean="0"/>
+              <a:t>digunakan</a:t>
+            </a:r>
+            <a:r>
+              <a:rPr lang="en-US" dirty="0"/>
+              <a:t> </a:t>
+            </a:r>
+            <a:r>
+              <a:rPr lang="en-US" dirty="0" err="1" smtClean="0"/>
+              <a:t>sesuai</a:t>
+            </a:r>
+            <a:r>
+              <a:rPr lang="en-US" dirty="0" smtClean="0"/>
+              <a:t> </a:t>
+            </a:r>
+            <a:r>
+              <a:rPr lang="en-US" dirty="0" err="1" smtClean="0"/>
+              <a:t>dengan</a:t>
+            </a:r>
+            <a:r>
+              <a:rPr lang="en-US" dirty="0" smtClean="0"/>
+              <a:t> </a:t>
+            </a:r>
+            <a:r>
+              <a:rPr lang="en-US" dirty="0" err="1" smtClean="0"/>
+              <a:t>kebutuhan</a:t>
+            </a:r>
+            <a:r>
+              <a:rPr lang="en-US" dirty="0" smtClean="0"/>
+              <a:t> </a:t>
+            </a:r>
+            <a:r>
+              <a:rPr lang="en-US" dirty="0" err="1" smtClean="0"/>
+              <a:t>dari</a:t>
+            </a:r>
+            <a:r>
+              <a:rPr lang="en-US" dirty="0"/>
+              <a:t> </a:t>
+            </a:r>
+            <a:r>
+              <a:rPr lang="en-US" dirty="0" err="1" smtClean="0"/>
+              <a:t>pengguna</a:t>
+            </a:r>
+            <a:r>
+              <a:rPr lang="en-US" dirty="0" smtClean="0"/>
+              <a:t>.</a:t>
+            </a:r>
             <a:endParaRPr lang="en-US" dirty="0"/>
           </a:p>
         </p:txBody>
@@ -22703,6 +22941,14 @@
             </a:r>
           </a:p>
           <a:p>
+            <a:pPr>
+              <a:buFont typeface="Arial" panose="020B0604020202020204" pitchFamily="34" charset="0"/>
+              <a:buChar char="•"/>
+            </a:pPr>
+            <a:r>
+              <a:rPr lang="en-US" dirty="0" smtClean="0"/>
+              <a:t> </a:t>
+            </a:r>
             <a:r>
               <a:rPr lang="en-US" dirty="0" err="1" smtClean="0"/>
               <a:t>Beresiko</a:t>
@@ -22742,6 +22988,14 @@
             <a:endParaRPr lang="en-US" dirty="0" smtClean="0"/>
           </a:p>
           <a:p>
+            <a:pPr>
+              <a:buFont typeface="Arial" panose="020B0604020202020204" pitchFamily="34" charset="0"/>
+              <a:buChar char="•"/>
+            </a:pPr>
+            <a:r>
+              <a:rPr lang="en-US" dirty="0" smtClean="0"/>
+              <a:t> </a:t>
+            </a:r>
             <a:r>
               <a:rPr lang="en-US" dirty="0" err="1" smtClean="0"/>
               <a:t>Beresiko</a:t>
@@ -22764,6 +23018,14 @@
             </a:r>
           </a:p>
           <a:p>
+            <a:pPr>
+              <a:buFont typeface="Arial" panose="020B0604020202020204" pitchFamily="34" charset="0"/>
+              <a:buChar char="•"/>
+            </a:pPr>
+            <a:r>
+              <a:rPr lang="en-US" dirty="0" smtClean="0"/>
+              <a:t> </a:t>
+            </a:r>
             <a:r>
               <a:rPr lang="en-US" dirty="0" err="1" smtClean="0"/>
               <a:t>Sulit</a:t>
@@ -22828,6 +23090,117 @@
               <a:rPr lang="en-US" dirty="0" smtClean="0"/>
               <a:t> service.</a:t>
             </a:r>
+          </a:p>
+          <a:p>
+            <a:pPr>
+              <a:buFont typeface="Arial" panose="020B0604020202020204" pitchFamily="34" charset="0"/>
+              <a:buChar char="•"/>
+            </a:pPr>
+            <a:r>
+              <a:rPr lang="en-US" dirty="0"/>
+              <a:t> </a:t>
+            </a:r>
+            <a:r>
+              <a:rPr lang="en-US" dirty="0" err="1" smtClean="0"/>
+              <a:t>Cocok</a:t>
+            </a:r>
+            <a:r>
+              <a:rPr lang="en-US" dirty="0" smtClean="0"/>
+              <a:t> </a:t>
+            </a:r>
+            <a:r>
+              <a:rPr lang="en-US" dirty="0" err="1" smtClean="0"/>
+              <a:t>apabila</a:t>
+            </a:r>
+            <a:r>
+              <a:rPr lang="en-US" dirty="0" smtClean="0"/>
+              <a:t> service </a:t>
+            </a:r>
+            <a:r>
+              <a:rPr lang="en-US" dirty="0" err="1" smtClean="0"/>
+              <a:t>tidak</a:t>
+            </a:r>
+            <a:r>
+              <a:rPr lang="en-US" dirty="0" smtClean="0"/>
+              <a:t> </a:t>
+            </a:r>
+            <a:r>
+              <a:rPr lang="en-US" dirty="0" err="1" smtClean="0"/>
+              <a:t>banyak</a:t>
+            </a:r>
+            <a:r>
+              <a:rPr lang="en-US" dirty="0" smtClean="0"/>
+              <a:t> </a:t>
+            </a:r>
+            <a:r>
+              <a:rPr lang="en-US" dirty="0" err="1" smtClean="0"/>
+              <a:t>dan</a:t>
+            </a:r>
+            <a:r>
+              <a:rPr lang="en-US" dirty="0" smtClean="0"/>
+              <a:t> </a:t>
+            </a:r>
+            <a:r>
+              <a:rPr lang="en-US" dirty="0" err="1" smtClean="0"/>
+              <a:t>adanya</a:t>
+            </a:r>
+            <a:r>
+              <a:rPr lang="en-US" dirty="0" smtClean="0"/>
+              <a:t> </a:t>
+            </a:r>
+            <a:r>
+              <a:rPr lang="en-US" dirty="0" err="1" smtClean="0"/>
+              <a:t>kebutuhan</a:t>
+            </a:r>
+            <a:r>
+              <a:rPr lang="en-US" dirty="0" smtClean="0"/>
+              <a:t> </a:t>
+            </a:r>
+            <a:r>
+              <a:rPr lang="en-US" dirty="0" err="1" smtClean="0"/>
+              <a:t>untuk</a:t>
+            </a:r>
+            <a:r>
+              <a:rPr lang="en-US" dirty="0" smtClean="0"/>
+              <a:t> </a:t>
+            </a:r>
+            <a:r>
+              <a:rPr lang="en-US" dirty="0" err="1" smtClean="0"/>
+              <a:t>menghemat</a:t>
+            </a:r>
+            <a:r>
+              <a:rPr lang="en-US" dirty="0" smtClean="0"/>
+              <a:t> </a:t>
+            </a:r>
+            <a:r>
+              <a:rPr lang="en-US" dirty="0" err="1" smtClean="0"/>
+              <a:t>penggunaan</a:t>
+            </a:r>
+            <a:r>
+              <a:rPr lang="en-US" dirty="0" smtClean="0"/>
+              <a:t> </a:t>
+            </a:r>
+            <a:r>
+              <a:rPr lang="en-US" dirty="0" err="1" smtClean="0"/>
+              <a:t>sumber</a:t>
+            </a:r>
+            <a:r>
+              <a:rPr lang="en-US" dirty="0" smtClean="0"/>
+              <a:t> </a:t>
+            </a:r>
+            <a:r>
+              <a:rPr lang="en-US" dirty="0" err="1" smtClean="0"/>
+              <a:t>daya</a:t>
+            </a:r>
+            <a:r>
+              <a:rPr lang="en-US" dirty="0" smtClean="0"/>
+              <a:t> (</a:t>
+            </a:r>
+            <a:r>
+              <a:rPr lang="en-US" i="1" dirty="0" smtClean="0"/>
+              <a:t>cost).</a:t>
+            </a:r>
+            <a:endParaRPr lang="en-US" dirty="0" smtClean="0"/>
           </a:p>
         </p:txBody>
       </p:sp>
@@ -22940,45 +23313,91 @@
             </a:r>
           </a:p>
           <a:p>
+            <a:pPr>
+              <a:buFont typeface="Arial" panose="020B0604020202020204" pitchFamily="34" charset="0"/>
+              <a:buChar char="•"/>
+            </a:pPr>
             <a:r>
               <a:rPr lang="en-US" i="1" dirty="0" smtClean="0"/>
+              <a:t> </a:t>
+            </a:r>
+            <a:r>
+              <a:rPr lang="en-US" dirty="0" err="1" smtClean="0"/>
+              <a:t>Mengatasi</a:t>
+            </a:r>
+            <a:r>
+              <a:rPr lang="en-US" dirty="0" smtClean="0"/>
+              <a:t> </a:t>
+            </a:r>
+            <a:r>
+              <a:rPr lang="en-US" dirty="0" err="1" smtClean="0"/>
+              <a:t>kelemahan</a:t>
+            </a:r>
+            <a:r>
+              <a:rPr lang="en-US" dirty="0" smtClean="0"/>
+              <a:t> </a:t>
+            </a:r>
+            <a:r>
+              <a:rPr lang="en-US" dirty="0" err="1" smtClean="0"/>
+              <a:t>dari</a:t>
+            </a:r>
+            <a:r>
+              <a:rPr lang="en-US" dirty="0" smtClean="0"/>
+              <a:t> multiple service per host.</a:t>
+            </a:r>
+          </a:p>
+          <a:p>
+            <a:pPr>
+              <a:buFont typeface="Arial" panose="020B0604020202020204" pitchFamily="34" charset="0"/>
+              <a:buChar char="•"/>
+            </a:pPr>
+            <a:r>
+              <a:rPr lang="en-US" dirty="0"/>
+              <a:t> </a:t>
+            </a:r>
+            <a:r>
+              <a:rPr lang="en-US" i="1" dirty="0"/>
               <a:t>Resource </a:t>
             </a:r>
             <a:r>
-              <a:rPr lang="en-US" dirty="0" err="1" smtClean="0"/>
+              <a:rPr lang="en-US" dirty="0" err="1"/>
               <a:t>dan</a:t>
             </a:r>
             <a:r>
-              <a:rPr lang="en-US" dirty="0" smtClean="0"/>
-              <a:t> </a:t>
-            </a:r>
-            <a:r>
-              <a:rPr lang="en-US" dirty="0" err="1" smtClean="0"/>
+              <a:rPr lang="en-US" dirty="0"/>
+              <a:t> </a:t>
+            </a:r>
+            <a:r>
+              <a:rPr lang="en-US" dirty="0" err="1"/>
               <a:t>biaya</a:t>
             </a:r>
             <a:r>
-              <a:rPr lang="en-US" dirty="0" smtClean="0"/>
+              <a:rPr lang="en-US" dirty="0"/>
               <a:t> yang </a:t>
             </a:r>
             <a:r>
-              <a:rPr lang="en-US" dirty="0" err="1" smtClean="0"/>
+              <a:rPr lang="en-US" dirty="0" err="1"/>
               <a:t>dikeluarkan</a:t>
             </a:r>
             <a:r>
-              <a:rPr lang="en-US" dirty="0" smtClean="0"/>
-              <a:t> </a:t>
-            </a:r>
-            <a:r>
-              <a:rPr lang="en-US" dirty="0" err="1" smtClean="0"/>
+              <a:rPr lang="en-US" dirty="0"/>
+              <a:t> </a:t>
+            </a:r>
+            <a:r>
+              <a:rPr lang="en-US" dirty="0" err="1"/>
               <a:t>lebih</a:t>
             </a:r>
             <a:r>
-              <a:rPr lang="en-US" dirty="0" smtClean="0"/>
-              <a:t> </a:t>
-            </a:r>
-            <a:r>
-              <a:rPr lang="en-US" dirty="0" err="1" smtClean="0"/>
+              <a:rPr lang="en-US" dirty="0"/>
+              <a:t> </a:t>
+            </a:r>
+            <a:r>
+              <a:rPr lang="en-US" dirty="0" err="1"/>
               <a:t>besar</a:t>
+            </a:r>
+            <a:r>
+              <a:rPr lang="en-US" dirty="0" smtClean="0"/>
+              <a:t>.</a:t>
             </a:r>
             <a:endParaRPr lang="en-US" dirty="0"/>
           </a:p>
@@ -23093,6 +23512,14 @@
             </a:r>
           </a:p>
           <a:p>
+            <a:pPr>
+              <a:buFont typeface="Arial" panose="020B0604020202020204" pitchFamily="34" charset="0"/>
+              <a:buChar char="•"/>
+            </a:pPr>
+            <a:r>
+              <a:rPr lang="en-US" dirty="0" smtClean="0"/>
+              <a:t> </a:t>
+            </a:r>
             <a:r>
               <a:rPr lang="en-US" dirty="0" err="1" smtClean="0"/>
               <a:t>Apabila</a:t>
@@ -23127,9 +23554,13 @@
             </a:r>
           </a:p>
           <a:p>
-            <a:r>
-              <a:rPr lang="en-US" dirty="0" smtClean="0"/>
-              <a:t>Container </a:t>
+            <a:pPr>
+              <a:buFont typeface="Arial" panose="020B0604020202020204" pitchFamily="34" charset="0"/>
+              <a:buChar char="•"/>
+            </a:pPr>
+            <a:r>
+              <a:rPr lang="en-US" dirty="0" smtClean="0"/>
+              <a:t> Container </a:t>
             </a:r>
             <a:r>
               <a:rPr lang="en-US" dirty="0" err="1" smtClean="0"/>
@@ -23157,9 +23588,13 @@
             </a:r>
           </a:p>
           <a:p>
-            <a:r>
-              <a:rPr lang="en-US" dirty="0" smtClean="0"/>
-              <a:t>User </a:t>
+            <a:pPr>
+              <a:buFont typeface="Arial" panose="020B0604020202020204" pitchFamily="34" charset="0"/>
+              <a:buChar char="•"/>
+            </a:pPr>
+            <a:r>
+              <a:rPr lang="en-US" dirty="0" smtClean="0"/>
+              <a:t> User </a:t>
             </a:r>
             <a:r>
               <a:rPr lang="en-US" dirty="0" err="1" smtClean="0"/>
@@ -23232,8 +23667,8 @@
         </p:blipFill>
         <p:spPr>
           <a:xfrm>
-            <a:off x="7962900" y="529654"/>
-            <a:ext cx="2781300" cy="3311525"/>
+            <a:off x="8117304" y="529655"/>
+            <a:ext cx="2626895" cy="3192114"/>
           </a:xfrm>
           <a:prstGeom prst="rect">
             <a:avLst/>
@@ -23713,15 +24148,23 @@
               <a:buNone/>
             </a:pPr>
             <a:r>
-              <a:rPr lang="en-US" dirty="0" err="1" smtClean="0"/>
-              <a:t>Kelebihan</a:t>
-            </a:r>
-            <a:r>
-              <a:rPr lang="en-US" dirty="0" smtClean="0"/>
-              <a:t> :</a:t>
+              <a:rPr lang="en-US" i="1" dirty="0" err="1" smtClean="0"/>
+              <a:t>Serverless</a:t>
+            </a:r>
+            <a:r>
+              <a:rPr lang="en-US" i="1" dirty="0" smtClean="0"/>
+              <a:t> deployment</a:t>
             </a:r>
           </a:p>
           <a:p>
+            <a:pPr>
+              <a:buFont typeface="Arial" panose="020B0604020202020204" pitchFamily="34" charset="0"/>
+              <a:buChar char="•"/>
+            </a:pPr>
+            <a:r>
+              <a:rPr lang="en-US" dirty="0" smtClean="0"/>
+              <a:t> </a:t>
+            </a:r>
             <a:r>
               <a:rPr lang="en-US" dirty="0" err="1" smtClean="0"/>
               <a:t>Tidak</a:t>
@@ -23820,6 +24263,14 @@
             </a:r>
           </a:p>
           <a:p>
+            <a:pPr>
+              <a:buFont typeface="Arial" panose="020B0604020202020204" pitchFamily="34" charset="0"/>
+              <a:buChar char="•"/>
+            </a:pPr>
+            <a:r>
+              <a:rPr lang="en-US" dirty="0" smtClean="0"/>
+              <a:t> </a:t>
+            </a:r>
             <a:r>
               <a:rPr lang="en-US" dirty="0" err="1" smtClean="0"/>
               <a:t>Sangat</a:t>
@@ -23931,6 +24382,14 @@
             </a:r>
           </a:p>
           <a:p>
+            <a:pPr>
+              <a:buFont typeface="Arial" panose="020B0604020202020204" pitchFamily="34" charset="0"/>
+              <a:buChar char="•"/>
+            </a:pPr>
+            <a:r>
+              <a:rPr lang="en-US" dirty="0" smtClean="0"/>
+              <a:t> </a:t>
+            </a:r>
             <a:r>
               <a:rPr lang="en-US" dirty="0" err="1" smtClean="0"/>
               <a:t>Adanya</a:t>
@@ -24084,6 +24543,14 @@
             </a:r>
           </a:p>
           <a:p>
+            <a:pPr>
+              <a:buFont typeface="Arial" panose="020B0604020202020204" pitchFamily="34" charset="0"/>
+              <a:buChar char="•"/>
+            </a:pPr>
+            <a:r>
+              <a:rPr lang="en-US" dirty="0" smtClean="0"/>
+              <a:t> </a:t>
+            </a:r>
             <a:r>
               <a:rPr lang="en-US" dirty="0" err="1" smtClean="0"/>
               <a:t>Komunikasi</a:t>
@@ -24118,6 +24585,14 @@
             </a:r>
           </a:p>
           <a:p>
+            <a:pPr>
+              <a:buFont typeface="Arial" panose="020B0604020202020204" pitchFamily="34" charset="0"/>
+              <a:buChar char="•"/>
+            </a:pPr>
+            <a:r>
+              <a:rPr lang="en-US" dirty="0" smtClean="0"/>
+              <a:t> </a:t>
+            </a:r>
             <a:r>
               <a:rPr lang="en-US" dirty="0" err="1" smtClean="0"/>
               <a:t>Faham</a:t>
@@ -24128,7 +24603,7 @@
             </a:r>
             <a:r>
               <a:rPr lang="en-US" dirty="0" err="1" smtClean="0"/>
-              <a:t>langsung</a:t>
+              <a:t>perintah</a:t>
             </a:r>
             <a:r>
               <a:rPr lang="en-US" dirty="0" smtClean="0"/>
@@ -24144,14 +24619,31 @@
             </a:r>
             <a:r>
               <a:rPr lang="en-US" dirty="0" err="1" smtClean="0"/>
-              <a:t>perintah</a:t>
-            </a:r>
-            <a:r>
-              <a:rPr lang="en-US" dirty="0" smtClean="0"/>
-              <a:t> GET, POST, PUT </a:t>
-            </a:r>
+              <a:t>verba</a:t>
+            </a:r>
+            <a:r>
+              <a:rPr lang="en-US" dirty="0" smtClean="0"/>
+              <a:t> GET</a:t>
+            </a:r>
+            <a:r>
+              <a:rPr lang="en-US" dirty="0" smtClean="0"/>
+              <a:t>, POST, </a:t>
+            </a:r>
+            <a:r>
+              <a:rPr lang="en-US" dirty="0" smtClean="0"/>
+              <a:t>PUT, &amp; DELETE.</a:t>
+            </a:r>
+            <a:endParaRPr lang="en-US" dirty="0" smtClean="0"/>
           </a:p>
           <a:p>
+            <a:pPr>
+              <a:buFont typeface="Arial" panose="020B0604020202020204" pitchFamily="34" charset="0"/>
+              <a:buChar char="•"/>
+            </a:pPr>
+            <a:r>
+              <a:rPr lang="en-US" dirty="0" smtClean="0"/>
+              <a:t> </a:t>
+            </a:r>
             <a:r>
               <a:rPr lang="en-US" dirty="0" err="1" smtClean="0"/>
               <a:t>Hasil</a:t>
@@ -24170,11 +24662,23 @@
             </a:r>
             <a:r>
               <a:rPr lang="en-US" dirty="0" err="1" smtClean="0"/>
+              <a:t>dapat</a:t>
+            </a:r>
+            <a:r>
+              <a:rPr lang="en-US" dirty="0" smtClean="0"/>
+              <a:t> </a:t>
+            </a:r>
+            <a:r>
+              <a:rPr lang="en-US" dirty="0" err="1" smtClean="0"/>
               <a:t>berupa</a:t>
             </a:r>
             <a:r>
               <a:rPr lang="en-US" dirty="0" smtClean="0"/>
-              <a:t> JSON yang </a:t>
+              <a:t> </a:t>
+            </a:r>
+            <a:r>
+              <a:rPr lang="en-US" dirty="0" smtClean="0"/>
+              <a:t>JSON yang </a:t>
             </a:r>
             <a:r>
               <a:rPr lang="en-US" dirty="0" err="1" smtClean="0"/>
@@ -24190,10 +24694,43 @@
             </a:r>
             <a:r>
               <a:rPr lang="en-US" dirty="0" smtClean="0"/>
+              <a:t> </a:t>
+            </a:r>
+            <a:r>
+              <a:rPr lang="en-US" dirty="0" err="1" smtClean="0"/>
+              <a:t>dan</a:t>
+            </a:r>
+            <a:r>
+              <a:rPr lang="en-US" dirty="0" smtClean="0"/>
+              <a:t> </a:t>
+            </a:r>
+            <a:r>
+              <a:rPr lang="en-US" dirty="0" err="1" smtClean="0"/>
+              <a:t>hemat</a:t>
+            </a:r>
+            <a:r>
+              <a:rPr lang="en-US" dirty="0" smtClean="0"/>
+              <a:t> </a:t>
+            </a:r>
+            <a:r>
+              <a:rPr lang="en-US" i="1" dirty="0" smtClean="0"/>
+              <a:t>bandwidth</a:t>
+            </a:r>
+            <a:r>
+              <a:rPr lang="en-US" dirty="0" smtClean="0"/>
               <a:t>.</a:t>
             </a:r>
+            <a:endParaRPr lang="en-US" dirty="0" smtClean="0"/>
           </a:p>
           <a:p>
+            <a:pPr>
+              <a:buFont typeface="Arial" panose="020B0604020202020204" pitchFamily="34" charset="0"/>
+              <a:buChar char="•"/>
+            </a:pPr>
+            <a:r>
+              <a:rPr lang="en-US" dirty="0" smtClean="0"/>
+              <a:t> </a:t>
+            </a:r>
             <a:r>
               <a:rPr lang="en-US" dirty="0" err="1" smtClean="0"/>
               <a:t>Menghindari</a:t>
@@ -24224,7 +24761,7 @@
             </a:r>
             <a:r>
               <a:rPr lang="en-US" dirty="0" smtClean="0"/>
-              <a:t> user</a:t>
+              <a:t> user.</a:t>
             </a:r>
           </a:p>
         </p:txBody>
@@ -24818,123 +25355,7 @@
               <a:rPr lang="en-US" dirty="0" err="1" smtClean="0"/>
               <a:t>sama</a:t>
             </a:r>
-            <a:r>
-              <a:rPr lang="en-US" dirty="0" smtClean="0"/>
-              <a:t>.</a:t>
-            </a:r>
-          </a:p>
-          <a:p>
-            <a:pPr marL="457200" indent="-457200">
-              <a:buFont typeface="+mj-lt"/>
-              <a:buAutoNum type="arabicPeriod"/>
-            </a:pPr>
-            <a:endParaRPr lang="en-US" dirty="0"/>
-          </a:p>
-          <a:p>
-            <a:pPr marL="0" indent="0">
-              <a:buNone/>
-            </a:pPr>
-            <a:r>
-              <a:rPr lang="en-US" dirty="0" err="1" smtClean="0"/>
-              <a:t>Berdasarkan</a:t>
-            </a:r>
-            <a:r>
-              <a:rPr lang="en-US" dirty="0" smtClean="0"/>
-              <a:t> </a:t>
-            </a:r>
-            <a:r>
-              <a:rPr lang="en-US" dirty="0" err="1" smtClean="0"/>
-              <a:t>analisa</a:t>
-            </a:r>
-            <a:r>
-              <a:rPr lang="en-US" dirty="0" smtClean="0"/>
-              <a:t> </a:t>
-            </a:r>
-            <a:r>
-              <a:rPr lang="en-US" dirty="0" err="1" smtClean="0"/>
-              <a:t>ketiga</a:t>
-            </a:r>
-            <a:r>
-              <a:rPr lang="en-US" dirty="0" smtClean="0"/>
-              <a:t> </a:t>
-            </a:r>
-            <a:r>
-              <a:rPr lang="en-US" dirty="0" err="1" smtClean="0"/>
-              <a:t>faktor</a:t>
-            </a:r>
-            <a:r>
-              <a:rPr lang="en-US" dirty="0" smtClean="0"/>
-              <a:t> </a:t>
-            </a:r>
-            <a:r>
-              <a:rPr lang="en-US" dirty="0" err="1" smtClean="0"/>
-              <a:t>diatas</a:t>
-            </a:r>
-            <a:r>
-              <a:rPr lang="en-US" dirty="0" smtClean="0"/>
-              <a:t>, </a:t>
-            </a:r>
-            <a:r>
-              <a:rPr lang="en-US" dirty="0" err="1" smtClean="0"/>
-              <a:t>dapat</a:t>
-            </a:r>
-            <a:r>
-              <a:rPr lang="en-US" dirty="0" smtClean="0"/>
-              <a:t> </a:t>
-            </a:r>
-            <a:r>
-              <a:rPr lang="en-US" dirty="0" err="1" smtClean="0"/>
-              <a:t>disimpulkan</a:t>
-            </a:r>
-            <a:r>
-              <a:rPr lang="en-US" dirty="0" smtClean="0"/>
-              <a:t> </a:t>
-            </a:r>
-            <a:r>
-              <a:rPr lang="en-US" dirty="0" err="1" smtClean="0"/>
-              <a:t>bahwa</a:t>
-            </a:r>
-            <a:r>
-              <a:rPr lang="en-US" dirty="0" smtClean="0"/>
-              <a:t> </a:t>
-            </a:r>
-            <a:r>
-              <a:rPr lang="en-US" dirty="0" err="1" smtClean="0"/>
-              <a:t>arsitektur</a:t>
-            </a:r>
-            <a:r>
-              <a:rPr lang="en-US" dirty="0"/>
-              <a:t> </a:t>
-            </a:r>
-            <a:r>
-              <a:rPr lang="en-US" dirty="0" err="1" smtClean="0"/>
-              <a:t>dari</a:t>
-            </a:r>
-            <a:r>
-              <a:rPr lang="en-US" dirty="0" smtClean="0"/>
-              <a:t> </a:t>
-            </a:r>
-            <a:r>
-              <a:rPr lang="en-US" dirty="0" err="1" smtClean="0"/>
-              <a:t>Apertura</a:t>
-            </a:r>
-            <a:r>
-              <a:rPr lang="en-US" dirty="0" smtClean="0"/>
-              <a:t> </a:t>
-            </a:r>
-            <a:r>
-              <a:rPr lang="en-US" dirty="0" err="1" smtClean="0"/>
-              <a:t>adalah</a:t>
-            </a:r>
-            <a:r>
-              <a:rPr lang="en-US" dirty="0" smtClean="0"/>
-              <a:t> </a:t>
-            </a:r>
-            <a:r>
-              <a:rPr lang="en-US" dirty="0" err="1" smtClean="0"/>
-              <a:t>monolitik</a:t>
-            </a:r>
-            <a:endParaRPr lang="en-US" dirty="0"/>
+            <a:endParaRPr lang="en-US" dirty="0" smtClean="0"/>
           </a:p>
         </p:txBody>
       </p:sp>
@@ -25063,6 +25484,328 @@
       </p:grpSpPr>
       <p:sp>
         <p:nvSpPr>
+          <p:cNvPr id="6" name="Title 1"/>
+          <p:cNvSpPr>
+            <a:spLocks noGrp="1"/>
+          </p:cNvSpPr>
+          <p:nvPr>
+            <p:ph type="title"/>
+          </p:nvPr>
+        </p:nvSpPr>
+        <p:spPr>
+          <a:xfrm>
+            <a:off x="1024128" y="585216"/>
+            <a:ext cx="9720072" cy="1499616"/>
+          </a:xfrm>
+        </p:spPr>
+        <p:txBody>
+          <a:bodyPr/>
+          <a:lstStyle/>
+          <a:p>
+            <a:r>
+              <a:rPr lang="en-US" dirty="0" err="1" smtClean="0"/>
+              <a:t>Analisa</a:t>
+            </a:r>
+            <a:r>
+              <a:rPr lang="en-US" dirty="0" smtClean="0"/>
+              <a:t> software </a:t>
+            </a:r>
+            <a:r>
+              <a:rPr lang="en-US" dirty="0" err="1" smtClean="0"/>
+              <a:t>apertura</a:t>
+            </a:r>
+            <a:endParaRPr lang="en-US" dirty="0"/>
+          </a:p>
+        </p:txBody>
+      </p:sp>
+      <p:sp>
+        <p:nvSpPr>
+          <p:cNvPr id="7" name="Content Placeholder 2"/>
+          <p:cNvSpPr>
+            <a:spLocks noGrp="1"/>
+          </p:cNvSpPr>
+          <p:nvPr>
+            <p:ph idx="1"/>
+          </p:nvPr>
+        </p:nvSpPr>
+        <p:spPr>
+          <a:xfrm>
+            <a:off x="1024128" y="2286000"/>
+            <a:ext cx="9720073" cy="4023360"/>
+          </a:xfrm>
+        </p:spPr>
+        <p:txBody>
+          <a:bodyPr/>
+          <a:lstStyle/>
+          <a:p>
+            <a:pPr marL="457200" indent="-457200">
+              <a:buFont typeface="+mj-lt"/>
+              <a:buAutoNum type="arabicPeriod"/>
+            </a:pPr>
+            <a:r>
+              <a:rPr lang="en-US" dirty="0" smtClean="0"/>
+              <a:t>Data </a:t>
+            </a:r>
+            <a:r>
+              <a:rPr lang="en-US" dirty="0" err="1" smtClean="0"/>
+              <a:t>menejemen</a:t>
+            </a:r>
+            <a:r>
+              <a:rPr lang="en-US" dirty="0" smtClean="0"/>
+              <a:t> : </a:t>
+            </a:r>
+            <a:r>
+              <a:rPr lang="en-US" dirty="0" err="1" smtClean="0"/>
+              <a:t>Banyak</a:t>
+            </a:r>
+            <a:r>
+              <a:rPr lang="en-US" dirty="0" smtClean="0"/>
+              <a:t> table </a:t>
+            </a:r>
+            <a:r>
+              <a:rPr lang="en-US" dirty="0" err="1" smtClean="0"/>
+              <a:t>dalam</a:t>
+            </a:r>
+            <a:r>
+              <a:rPr lang="en-US" dirty="0" smtClean="0"/>
+              <a:t> 1 </a:t>
+            </a:r>
+            <a:r>
+              <a:rPr lang="en-US" dirty="0" err="1" smtClean="0"/>
+              <a:t>buah</a:t>
+            </a:r>
+            <a:r>
+              <a:rPr lang="en-US" dirty="0" smtClean="0"/>
+              <a:t> database.</a:t>
+            </a:r>
+          </a:p>
+          <a:p>
+            <a:pPr marL="457200" indent="-457200">
+              <a:buFont typeface="+mj-lt"/>
+              <a:buAutoNum type="arabicPeriod"/>
+            </a:pPr>
+            <a:r>
+              <a:rPr lang="en-US" dirty="0" smtClean="0"/>
+              <a:t>Cara </a:t>
+            </a:r>
+            <a:r>
+              <a:rPr lang="en-US" dirty="0" err="1" smtClean="0"/>
+              <a:t>berkomunikasi</a:t>
+            </a:r>
+            <a:r>
+              <a:rPr lang="en-US" dirty="0" smtClean="0"/>
+              <a:t> : Query </a:t>
+            </a:r>
+            <a:r>
+              <a:rPr lang="en-US" dirty="0" err="1" smtClean="0"/>
+              <a:t>langsung</a:t>
+            </a:r>
+            <a:r>
+              <a:rPr lang="en-US" dirty="0" smtClean="0"/>
+              <a:t> </a:t>
+            </a:r>
+            <a:r>
+              <a:rPr lang="en-US" dirty="0" err="1" smtClean="0"/>
+              <a:t>terhadap</a:t>
+            </a:r>
+            <a:r>
+              <a:rPr lang="en-US" dirty="0" smtClean="0"/>
+              <a:t> database.</a:t>
+            </a:r>
+          </a:p>
+          <a:p>
+            <a:pPr marL="457200" indent="-457200">
+              <a:buFont typeface="+mj-lt"/>
+              <a:buAutoNum type="arabicPeriod"/>
+            </a:pPr>
+            <a:r>
+              <a:rPr lang="en-US" dirty="0" err="1" smtClean="0"/>
+              <a:t>Bentuk</a:t>
+            </a:r>
+            <a:r>
+              <a:rPr lang="en-US" dirty="0" smtClean="0"/>
+              <a:t> deployment : </a:t>
+            </a:r>
+            <a:r>
+              <a:rPr lang="en-US" dirty="0" err="1" smtClean="0"/>
+              <a:t>Terpusat</a:t>
+            </a:r>
+            <a:r>
+              <a:rPr lang="en-US" dirty="0" smtClean="0"/>
+              <a:t> </a:t>
+            </a:r>
+            <a:r>
+              <a:rPr lang="en-US" dirty="0" err="1" smtClean="0"/>
+              <a:t>pada</a:t>
+            </a:r>
+            <a:r>
+              <a:rPr lang="en-US" dirty="0" smtClean="0"/>
+              <a:t> 1 </a:t>
+            </a:r>
+            <a:r>
+              <a:rPr lang="en-US" dirty="0" err="1" smtClean="0"/>
+              <a:t>buah</a:t>
+            </a:r>
+            <a:r>
+              <a:rPr lang="en-US" dirty="0" smtClean="0"/>
+              <a:t> server yang </a:t>
+            </a:r>
+            <a:r>
+              <a:rPr lang="en-US" dirty="0" err="1" smtClean="0"/>
+              <a:t>sama</a:t>
+            </a:r>
+            <a:r>
+              <a:rPr lang="en-US" dirty="0" smtClean="0"/>
+              <a:t>.</a:t>
+            </a:r>
+          </a:p>
+          <a:p>
+            <a:pPr marL="457200" indent="-457200">
+              <a:buFont typeface="+mj-lt"/>
+              <a:buAutoNum type="arabicPeriod"/>
+            </a:pPr>
+            <a:endParaRPr lang="en-US" dirty="0"/>
+          </a:p>
+          <a:p>
+            <a:pPr marL="0" indent="0">
+              <a:buNone/>
+            </a:pPr>
+            <a:r>
+              <a:rPr lang="en-US" dirty="0" err="1" smtClean="0"/>
+              <a:t>Berdasarkan</a:t>
+            </a:r>
+            <a:r>
+              <a:rPr lang="en-US" dirty="0" smtClean="0"/>
+              <a:t> </a:t>
+            </a:r>
+            <a:r>
+              <a:rPr lang="en-US" dirty="0" err="1" smtClean="0"/>
+              <a:t>analisa</a:t>
+            </a:r>
+            <a:r>
+              <a:rPr lang="en-US" dirty="0" smtClean="0"/>
+              <a:t> </a:t>
+            </a:r>
+            <a:r>
+              <a:rPr lang="en-US" dirty="0" err="1" smtClean="0"/>
+              <a:t>ketiga</a:t>
+            </a:r>
+            <a:r>
+              <a:rPr lang="en-US" dirty="0" smtClean="0"/>
+              <a:t> </a:t>
+            </a:r>
+            <a:r>
+              <a:rPr lang="en-US" dirty="0" err="1" smtClean="0"/>
+              <a:t>faktor</a:t>
+            </a:r>
+            <a:r>
+              <a:rPr lang="en-US" dirty="0" smtClean="0"/>
+              <a:t> </a:t>
+            </a:r>
+            <a:r>
+              <a:rPr lang="en-US" dirty="0" err="1" smtClean="0"/>
+              <a:t>diatas</a:t>
+            </a:r>
+            <a:r>
+              <a:rPr lang="en-US" dirty="0" smtClean="0"/>
+              <a:t>, </a:t>
+            </a:r>
+            <a:r>
+              <a:rPr lang="en-US" dirty="0" err="1" smtClean="0"/>
+              <a:t>dapat</a:t>
+            </a:r>
+            <a:r>
+              <a:rPr lang="en-US" dirty="0" smtClean="0"/>
+              <a:t> </a:t>
+            </a:r>
+            <a:r>
+              <a:rPr lang="en-US" dirty="0" err="1" smtClean="0"/>
+              <a:t>disimpulkan</a:t>
+            </a:r>
+            <a:r>
+              <a:rPr lang="en-US" dirty="0" smtClean="0"/>
+              <a:t> </a:t>
+            </a:r>
+            <a:r>
+              <a:rPr lang="en-US" dirty="0" err="1" smtClean="0"/>
+              <a:t>bahwa</a:t>
+            </a:r>
+            <a:r>
+              <a:rPr lang="en-US" dirty="0" smtClean="0"/>
+              <a:t> </a:t>
+            </a:r>
+            <a:r>
+              <a:rPr lang="en-US" dirty="0" err="1" smtClean="0"/>
+              <a:t>arsitektur</a:t>
+            </a:r>
+            <a:r>
+              <a:rPr lang="en-US" dirty="0"/>
+              <a:t> </a:t>
+            </a:r>
+            <a:r>
+              <a:rPr lang="en-US" dirty="0" err="1" smtClean="0"/>
+              <a:t>dari</a:t>
+            </a:r>
+            <a:r>
+              <a:rPr lang="en-US" dirty="0" smtClean="0"/>
+              <a:t> </a:t>
+            </a:r>
+            <a:r>
+              <a:rPr lang="en-US" dirty="0" err="1" smtClean="0"/>
+              <a:t>Apertura</a:t>
+            </a:r>
+            <a:r>
+              <a:rPr lang="en-US" dirty="0" smtClean="0"/>
+              <a:t> </a:t>
+            </a:r>
+            <a:r>
+              <a:rPr lang="en-US" dirty="0" err="1" smtClean="0"/>
+              <a:t>adalah</a:t>
+            </a:r>
+            <a:r>
+              <a:rPr lang="en-US" dirty="0" smtClean="0"/>
+              <a:t> </a:t>
+            </a:r>
+            <a:r>
+              <a:rPr lang="en-US" dirty="0" err="1" smtClean="0"/>
+              <a:t>monolitik</a:t>
+            </a:r>
+            <a:endParaRPr lang="en-US" dirty="0"/>
+          </a:p>
+        </p:txBody>
+      </p:sp>
+    </p:spTree>
+    <p:extLst>
+      <p:ext uri="{BB962C8B-B14F-4D97-AF65-F5344CB8AC3E}">
+        <p14:creationId xmlns:p14="http://schemas.microsoft.com/office/powerpoint/2010/main" val="1987591819"/>
+      </p:ext>
+    </p:extLst>
+  </p:cSld>
+  <p:clrMapOvr>
+    <a:masterClrMapping/>
+  </p:clrMapOvr>
+</p:sld>
+</file>
+
+<file path=ppt/slides/slide28.xml><?xml version="1.0" encoding="utf-8"?>
+<p:sld xmlns:a="http://schemas.openxmlformats.org/drawingml/2006/main" xmlns:r="http://schemas.openxmlformats.org/officeDocument/2006/relationships" xmlns:p="http://schemas.openxmlformats.org/presentationml/2006/main">
+  <p:cSld>
+    <p:spTree>
+      <p:nvGrpSpPr>
+        <p:cNvPr id="1" name=""/>
+        <p:cNvGrpSpPr/>
+        <p:nvPr/>
+      </p:nvGrpSpPr>
+      <p:grpSpPr>
+        <a:xfrm>
+          <a:off x="0" y="0"/>
+          <a:ext cx="0" cy="0"/>
+          <a:chOff x="0" y="0"/>
+          <a:chExt cx="0" cy="0"/>
+        </a:xfrm>
+      </p:grpSpPr>
+      <p:sp>
+        <p:nvSpPr>
           <p:cNvPr id="2" name="Title 1"/>
           <p:cNvSpPr>
             <a:spLocks noGrp="1"/>
@@ -25153,7 +25896,7 @@
 </p:sld>
 </file>
 
-<file path=ppt/slides/slide28.xml><?xml version="1.0" encoding="utf-8"?>
+<file path=ppt/slides/slide29.xml><?xml version="1.0" encoding="utf-8"?>
 <p:sld xmlns:a="http://schemas.openxmlformats.org/drawingml/2006/main" xmlns:r="http://schemas.openxmlformats.org/officeDocument/2006/relationships" xmlns:p="http://schemas.openxmlformats.org/presentationml/2006/main">
   <p:cSld>
     <p:spTree>
@@ -25253,210 +25996,6 @@
     <p:extLst>
       <p:ext uri="{BB962C8B-B14F-4D97-AF65-F5344CB8AC3E}">
         <p14:creationId xmlns:p14="http://schemas.microsoft.com/office/powerpoint/2010/main" val="800253119"/>
-      </p:ext>
-    </p:extLst>
-  </p:cSld>
-  <p:clrMapOvr>
-    <a:masterClrMapping/>
-  </p:clrMapOvr>
-</p:sld>
-</file>
-
-<file path=ppt/slides/slide29.xml><?xml version="1.0" encoding="utf-8"?>
-<p:sld xmlns:a="http://schemas.openxmlformats.org/drawingml/2006/main" xmlns:r="http://schemas.openxmlformats.org/officeDocument/2006/relationships" xmlns:p="http://schemas.openxmlformats.org/presentationml/2006/main">
-  <p:cSld>
-    <p:spTree>
-      <p:nvGrpSpPr>
-        <p:cNvPr id="1" name=""/>
-        <p:cNvGrpSpPr/>
-        <p:nvPr/>
-      </p:nvGrpSpPr>
-      <p:grpSpPr>
-        <a:xfrm>
-          <a:off x="0" y="0"/>
-          <a:ext cx="0" cy="0"/>
-          <a:chOff x="0" y="0"/>
-          <a:chExt cx="0" cy="0"/>
-        </a:xfrm>
-      </p:grpSpPr>
-      <p:sp>
-        <p:nvSpPr>
-          <p:cNvPr id="2" name="Title 1"/>
-          <p:cNvSpPr>
-            <a:spLocks noGrp="1"/>
-          </p:cNvSpPr>
-          <p:nvPr>
-            <p:ph type="title"/>
-          </p:nvPr>
-        </p:nvSpPr>
-        <p:spPr/>
-        <p:txBody>
-          <a:bodyPr/>
-          <a:lstStyle/>
-          <a:p>
-            <a:r>
-              <a:rPr lang="en-US" dirty="0" err="1" smtClean="0"/>
-              <a:t>Identifikasi</a:t>
-            </a:r>
-            <a:r>
-              <a:rPr lang="en-US" dirty="0" smtClean="0"/>
-              <a:t> </a:t>
-            </a:r>
-            <a:r>
-              <a:rPr lang="en-US" dirty="0" err="1" smtClean="0"/>
-              <a:t>teknologi</a:t>
-            </a:r>
-            <a:r>
-              <a:rPr lang="en-US" dirty="0" smtClean="0"/>
-              <a:t> software </a:t>
-            </a:r>
-            <a:r>
-              <a:rPr lang="en-US" dirty="0" err="1" smtClean="0"/>
-              <a:t>apertura</a:t>
-            </a:r>
-            <a:endParaRPr lang="en-US" dirty="0"/>
-          </a:p>
-        </p:txBody>
-      </p:sp>
-      <p:sp>
-        <p:nvSpPr>
-          <p:cNvPr id="3" name="Content Placeholder 2"/>
-          <p:cNvSpPr>
-            <a:spLocks noGrp="1"/>
-          </p:cNvSpPr>
-          <p:nvPr>
-            <p:ph idx="1"/>
-          </p:nvPr>
-        </p:nvSpPr>
-        <p:spPr/>
-        <p:txBody>
-          <a:bodyPr/>
-          <a:lstStyle/>
-          <a:p>
-            <a:pPr marL="457200" indent="-457200">
-              <a:buFont typeface="+mj-lt"/>
-              <a:buAutoNum type="arabicPeriod"/>
-            </a:pPr>
-            <a:r>
-              <a:rPr lang="en-US" dirty="0" err="1" smtClean="0"/>
-              <a:t>Tersentralisasi</a:t>
-            </a:r>
-            <a:r>
-              <a:rPr lang="en-US" dirty="0" smtClean="0"/>
-              <a:t> </a:t>
-            </a:r>
-            <a:r>
-              <a:rPr lang="en-US" dirty="0" err="1" smtClean="0"/>
-              <a:t>dalam</a:t>
-            </a:r>
-            <a:r>
-              <a:rPr lang="en-US" dirty="0" smtClean="0"/>
-              <a:t> 1 </a:t>
-            </a:r>
-            <a:r>
-              <a:rPr lang="en-US" dirty="0" err="1" smtClean="0"/>
-              <a:t>buah</a:t>
-            </a:r>
-            <a:r>
-              <a:rPr lang="en-US" dirty="0" smtClean="0"/>
-              <a:t> server</a:t>
-            </a:r>
-          </a:p>
-          <a:p>
-            <a:pPr marL="457200" indent="-457200">
-              <a:buFont typeface="+mj-lt"/>
-              <a:buAutoNum type="arabicPeriod"/>
-            </a:pPr>
-            <a:r>
-              <a:rPr lang="en-US" dirty="0" err="1" smtClean="0"/>
-              <a:t>Memiliki</a:t>
-            </a:r>
-            <a:r>
-              <a:rPr lang="en-US" dirty="0" smtClean="0"/>
-              <a:t> </a:t>
-            </a:r>
-            <a:r>
-              <a:rPr lang="en-US" dirty="0" err="1" smtClean="0"/>
-              <a:t>kurang</a:t>
-            </a:r>
-            <a:r>
-              <a:rPr lang="en-US" dirty="0" smtClean="0"/>
-              <a:t> </a:t>
-            </a:r>
-            <a:r>
-              <a:rPr lang="en-US" dirty="0" err="1" smtClean="0"/>
-              <a:t>lebih</a:t>
-            </a:r>
-            <a:r>
-              <a:rPr lang="en-US" dirty="0" smtClean="0"/>
-              <a:t> 120 table </a:t>
-            </a:r>
-            <a:r>
-              <a:rPr lang="en-US" dirty="0" err="1" smtClean="0"/>
-              <a:t>dalam</a:t>
-            </a:r>
-            <a:r>
-              <a:rPr lang="en-US" dirty="0" smtClean="0"/>
-              <a:t> 1 </a:t>
-            </a:r>
-            <a:r>
-              <a:rPr lang="en-US" dirty="0" err="1" smtClean="0"/>
-              <a:t>buah</a:t>
-            </a:r>
-            <a:r>
-              <a:rPr lang="en-US" dirty="0" smtClean="0"/>
-              <a:t> database (PostgreSQL)</a:t>
-            </a:r>
-          </a:p>
-          <a:p>
-            <a:pPr marL="457200" indent="-457200">
-              <a:buFont typeface="+mj-lt"/>
-              <a:buAutoNum type="arabicPeriod"/>
-            </a:pPr>
-            <a:r>
-              <a:rPr lang="en-US" dirty="0" err="1" smtClean="0"/>
-              <a:t>Dikembangkan</a:t>
-            </a:r>
-            <a:r>
-              <a:rPr lang="en-US" dirty="0" smtClean="0"/>
-              <a:t> </a:t>
-            </a:r>
-            <a:r>
-              <a:rPr lang="en-US" dirty="0" err="1" smtClean="0"/>
-              <a:t>hanya</a:t>
-            </a:r>
-            <a:r>
-              <a:rPr lang="en-US" dirty="0" smtClean="0"/>
-              <a:t> </a:t>
-            </a:r>
-            <a:r>
-              <a:rPr lang="en-US" dirty="0" err="1" smtClean="0"/>
-              <a:t>dalam</a:t>
-            </a:r>
-            <a:r>
-              <a:rPr lang="en-US" dirty="0" smtClean="0"/>
-              <a:t> </a:t>
-            </a:r>
-            <a:r>
-              <a:rPr lang="en-US" dirty="0" err="1" smtClean="0"/>
-              <a:t>bentuk</a:t>
-            </a:r>
-            <a:r>
-              <a:rPr lang="en-US" dirty="0" smtClean="0"/>
-              <a:t> </a:t>
-            </a:r>
-            <a:r>
-              <a:rPr lang="en-US" i="1" dirty="0" smtClean="0"/>
-              <a:t>desktop.</a:t>
-            </a:r>
-            <a:endParaRPr lang="en-US" dirty="0"/>
-          </a:p>
-        </p:txBody>
-      </p:sp>
-    </p:spTree>
-    <p:extLst>
-      <p:ext uri="{BB962C8B-B14F-4D97-AF65-F5344CB8AC3E}">
-        <p14:creationId xmlns:p14="http://schemas.microsoft.com/office/powerpoint/2010/main" val="2816860820"/>
       </p:ext>
     </p:extLst>
   </p:cSld>
@@ -26243,23 +26782,23 @@
           <a:p>
             <a:r>
               <a:rPr lang="en-US" dirty="0" err="1" smtClean="0"/>
-              <a:t>Kekurangan</a:t>
-            </a:r>
-            <a:r>
-              <a:rPr lang="en-US" dirty="0" smtClean="0"/>
-              <a:t> </a:t>
-            </a:r>
-            <a:r>
-              <a:rPr lang="en-US" dirty="0" err="1" smtClean="0"/>
-              <a:t>arsitektur</a:t>
-            </a:r>
-            <a:r>
-              <a:rPr lang="en-US" dirty="0" smtClean="0"/>
-              <a:t> </a:t>
-            </a:r>
-            <a:r>
-              <a:rPr lang="en-US" dirty="0" err="1" smtClean="0"/>
-              <a:t>monolitik</a:t>
+              <a:t>Identifikasi</a:t>
+            </a:r>
+            <a:r>
+              <a:rPr lang="en-US" dirty="0" smtClean="0"/>
+              <a:t> </a:t>
+            </a:r>
+            <a:r>
+              <a:rPr lang="en-US" dirty="0" err="1" smtClean="0"/>
+              <a:t>teknologi</a:t>
+            </a:r>
+            <a:r>
+              <a:rPr lang="en-US" dirty="0" smtClean="0"/>
+              <a:t> software </a:t>
+            </a:r>
+            <a:r>
+              <a:rPr lang="en-US" dirty="0" err="1" smtClean="0"/>
+              <a:t>apertura</a:t>
             </a:r>
             <a:endParaRPr lang="en-US" dirty="0"/>
           </a:p>
@@ -26285,14 +26824,29 @@
               <a:buAutoNum type="arabicPeriod"/>
             </a:pPr>
             <a:r>
-              <a:rPr lang="en-US" dirty="0" smtClean="0"/>
-              <a:t>Tingkat coupling yang </a:t>
-            </a:r>
-            <a:r>
-              <a:rPr lang="en-US" dirty="0" err="1" smtClean="0"/>
-              <a:t>tinggi</a:t>
-            </a:r>
-            <a:endParaRPr lang="en-US" dirty="0" smtClean="0"/>
+              <a:rPr lang="en-US" dirty="0" err="1" smtClean="0"/>
+              <a:t>Tersentralisasi</a:t>
+            </a:r>
+            <a:r>
+              <a:rPr lang="en-US" dirty="0" smtClean="0"/>
+              <a:t> </a:t>
+            </a:r>
+            <a:r>
+              <a:rPr lang="en-US" dirty="0" err="1" smtClean="0"/>
+              <a:t>dalam</a:t>
+            </a:r>
+            <a:r>
+              <a:rPr lang="en-US" dirty="0" smtClean="0"/>
+              <a:t> 1 </a:t>
+            </a:r>
+            <a:r>
+              <a:rPr lang="en-US" dirty="0" err="1" smtClean="0"/>
+              <a:t>buah</a:t>
+            </a:r>
+            <a:r>
+              <a:rPr lang="en-US" dirty="0" smtClean="0"/>
+              <a:t> server</a:t>
+            </a:r>
           </a:p>
           <a:p>
             <a:pPr marL="457200" indent="-457200">
@@ -26300,30 +26854,45 @@
               <a:buAutoNum type="arabicPeriod"/>
             </a:pPr>
             <a:r>
-              <a:rPr lang="en-US" dirty="0" smtClean="0"/>
-              <a:t>Model </a:t>
-            </a:r>
-            <a:r>
-              <a:rPr lang="en-US" dirty="0" err="1" smtClean="0"/>
-              <a:t>penyimpanan</a:t>
-            </a:r>
-            <a:r>
-              <a:rPr lang="en-US" dirty="0" smtClean="0"/>
-              <a:t> data yang </a:t>
-            </a:r>
-            <a:r>
-              <a:rPr lang="en-US" dirty="0" err="1" smtClean="0"/>
-              <a:t>tidak</a:t>
-            </a:r>
-            <a:r>
-              <a:rPr lang="en-US" dirty="0" smtClean="0"/>
-              <a:t> </a:t>
-            </a:r>
-            <a:r>
-              <a:rPr lang="en-US" dirty="0" err="1" smtClean="0"/>
-              <a:t>baik</a:t>
-            </a:r>
-            <a:endParaRPr lang="en-US" dirty="0" smtClean="0"/>
+              <a:rPr lang="en-US" dirty="0" err="1" smtClean="0"/>
+              <a:t>Memiliki</a:t>
+            </a:r>
+            <a:r>
+              <a:rPr lang="en-US" dirty="0" smtClean="0"/>
+              <a:t> </a:t>
+            </a:r>
+            <a:r>
+              <a:rPr lang="en-US" dirty="0" err="1" smtClean="0"/>
+              <a:t>kurang</a:t>
+            </a:r>
+            <a:r>
+              <a:rPr lang="en-US" dirty="0" smtClean="0"/>
+              <a:t> </a:t>
+            </a:r>
+            <a:r>
+              <a:rPr lang="en-US" dirty="0" err="1" smtClean="0"/>
+              <a:t>lebih</a:t>
+            </a:r>
+            <a:r>
+              <a:rPr lang="en-US" dirty="0" smtClean="0"/>
+              <a:t> 120 table </a:t>
+            </a:r>
+            <a:r>
+              <a:rPr lang="en-US" dirty="0" err="1" smtClean="0"/>
+              <a:t>dalam</a:t>
+            </a:r>
+            <a:r>
+              <a:rPr lang="en-US" dirty="0" smtClean="0"/>
+              <a:t> 1 </a:t>
+            </a:r>
+            <a:r>
+              <a:rPr lang="en-US" dirty="0" err="1" smtClean="0"/>
+              <a:t>buah</a:t>
+            </a:r>
+            <a:r>
+              <a:rPr lang="en-US" dirty="0" smtClean="0"/>
+              <a:t> database (PostgreSQL)</a:t>
+            </a:r>
           </a:p>
           <a:p>
             <a:pPr marL="457200" indent="-457200">
@@ -26332,102 +26901,31 @@
             </a:pPr>
             <a:r>
               <a:rPr lang="en-US" dirty="0" err="1" smtClean="0"/>
-              <a:t>Isu</a:t>
-            </a:r>
-            <a:r>
-              <a:rPr lang="en-US" dirty="0" smtClean="0"/>
-              <a:t> </a:t>
-            </a:r>
-            <a:r>
-              <a:rPr lang="en-US" dirty="0" err="1" smtClean="0"/>
-              <a:t>keamanan</a:t>
-            </a:r>
-            <a:r>
-              <a:rPr lang="en-US" dirty="0" smtClean="0"/>
-              <a:t> yang </a:t>
-            </a:r>
-            <a:r>
-              <a:rPr lang="en-US" dirty="0" err="1" smtClean="0"/>
-              <a:t>tinggi</a:t>
-            </a:r>
-            <a:endParaRPr lang="en-US" dirty="0" smtClean="0"/>
-          </a:p>
-          <a:p>
-            <a:pPr marL="457200" indent="-457200">
-              <a:buFont typeface="+mj-lt"/>
-              <a:buAutoNum type="arabicPeriod"/>
-            </a:pPr>
-            <a:r>
-              <a:rPr lang="en-US" dirty="0" err="1" smtClean="0"/>
-              <a:t>Sistem</a:t>
-            </a:r>
-            <a:r>
-              <a:rPr lang="en-US" dirty="0" smtClean="0"/>
-              <a:t> </a:t>
-            </a:r>
-            <a:r>
-              <a:rPr lang="en-US" dirty="0" err="1" smtClean="0"/>
-              <a:t>tidak</a:t>
-            </a:r>
-            <a:r>
-              <a:rPr lang="en-US" dirty="0" smtClean="0"/>
-              <a:t> </a:t>
-            </a:r>
-            <a:r>
-              <a:rPr lang="en-US" dirty="0" err="1" smtClean="0"/>
-              <a:t>memberikan</a:t>
-            </a:r>
-            <a:r>
-              <a:rPr lang="en-US" dirty="0" smtClean="0"/>
-              <a:t> </a:t>
-            </a:r>
-            <a:r>
-              <a:rPr lang="en-US" dirty="0" err="1" smtClean="0"/>
-              <a:t>performa</a:t>
-            </a:r>
-            <a:r>
-              <a:rPr lang="en-US" dirty="0" smtClean="0"/>
-              <a:t> yang </a:t>
-            </a:r>
-            <a:r>
-              <a:rPr lang="en-US" dirty="0" err="1" smtClean="0"/>
-              <a:t>cukup</a:t>
-            </a:r>
-            <a:r>
-              <a:rPr lang="en-US" dirty="0" smtClean="0"/>
-              <a:t> </a:t>
-            </a:r>
-            <a:r>
-              <a:rPr lang="en-US" dirty="0" err="1" smtClean="0"/>
-              <a:t>baik</a:t>
-            </a:r>
-            <a:r>
-              <a:rPr lang="en-US" dirty="0" smtClean="0"/>
-              <a:t> </a:t>
-            </a:r>
-            <a:r>
-              <a:rPr lang="en-US" dirty="0" err="1" smtClean="0"/>
-              <a:t>ketika</a:t>
-            </a:r>
-            <a:r>
-              <a:rPr lang="en-US" dirty="0" smtClean="0"/>
-              <a:t> </a:t>
-            </a:r>
-            <a:r>
-              <a:rPr lang="en-US" dirty="0" err="1" smtClean="0"/>
-              <a:t>menangani</a:t>
-            </a:r>
-            <a:r>
-              <a:rPr lang="en-US" dirty="0" smtClean="0"/>
-              <a:t> </a:t>
-            </a:r>
-            <a:r>
-              <a:rPr lang="en-US" dirty="0" err="1" smtClean="0"/>
-              <a:t>banyak</a:t>
-            </a:r>
-            <a:r>
-              <a:rPr lang="en-US" dirty="0" smtClean="0"/>
-              <a:t> user</a:t>
+              <a:t>Dikembangkan</a:t>
+            </a:r>
+            <a:r>
+              <a:rPr lang="en-US" dirty="0" smtClean="0"/>
+              <a:t> </a:t>
+            </a:r>
+            <a:r>
+              <a:rPr lang="en-US" dirty="0" err="1" smtClean="0"/>
+              <a:t>dalam</a:t>
+            </a:r>
+            <a:r>
+              <a:rPr lang="en-US" dirty="0" smtClean="0"/>
+              <a:t> </a:t>
+            </a:r>
+            <a:r>
+              <a:rPr lang="en-US" dirty="0" err="1" smtClean="0"/>
+              <a:t>bentuk</a:t>
+            </a:r>
+            <a:r>
+              <a:rPr lang="en-US" dirty="0" smtClean="0"/>
+              <a:t> </a:t>
+            </a:r>
+            <a:r>
+              <a:rPr lang="en-US" i="1" dirty="0" smtClean="0"/>
+              <a:t>desktop.</a:t>
             </a:r>
             <a:endParaRPr lang="en-US" dirty="0"/>
           </a:p>
@@ -26436,7 +26934,7 @@
     </p:spTree>
     <p:extLst>
       <p:ext uri="{BB962C8B-B14F-4D97-AF65-F5344CB8AC3E}">
-        <p14:creationId xmlns:p14="http://schemas.microsoft.com/office/powerpoint/2010/main" val="3299405687"/>
+        <p14:creationId xmlns:p14="http://schemas.microsoft.com/office/powerpoint/2010/main" val="2816860820"/>
       </p:ext>
     </p:extLst>
   </p:cSld>
@@ -26480,7 +26978,23 @@
           <a:p>
             <a:r>
               <a:rPr lang="en-US" dirty="0" err="1" smtClean="0"/>
-              <a:t>Perancangan</a:t>
+              <a:t>Kekurangan</a:t>
+            </a:r>
+            <a:r>
+              <a:rPr lang="en-US" dirty="0" smtClean="0"/>
+              <a:t> </a:t>
+            </a:r>
+            <a:r>
+              <a:rPr lang="en-US" dirty="0" err="1" smtClean="0"/>
+              <a:t>arsitektur</a:t>
+            </a:r>
+            <a:r>
+              <a:rPr lang="en-US" dirty="0" smtClean="0"/>
+              <a:t> </a:t>
+            </a:r>
+            <a:r>
+              <a:rPr lang="en-US" dirty="0" err="1" smtClean="0"/>
+              <a:t>monolitik</a:t>
             </a:r>
             <a:endParaRPr lang="en-US" dirty="0"/>
           </a:p>
@@ -26501,6 +27015,155 @@
           <a:bodyPr/>
           <a:lstStyle/>
           <a:p>
+            <a:pPr marL="457200" indent="-457200">
+              <a:buFont typeface="+mj-lt"/>
+              <a:buAutoNum type="arabicPeriod"/>
+            </a:pPr>
+            <a:r>
+              <a:rPr lang="en-US" dirty="0" smtClean="0"/>
+              <a:t>Tingkat coupling yang </a:t>
+            </a:r>
+            <a:r>
+              <a:rPr lang="en-US" dirty="0" err="1" smtClean="0"/>
+              <a:t>tinggi</a:t>
+            </a:r>
+            <a:endParaRPr lang="en-US" dirty="0" smtClean="0"/>
+          </a:p>
+          <a:p>
+            <a:pPr marL="457200" indent="-457200">
+              <a:buFont typeface="+mj-lt"/>
+              <a:buAutoNum type="arabicPeriod"/>
+            </a:pPr>
+            <a:r>
+              <a:rPr lang="en-US" dirty="0" smtClean="0"/>
+              <a:t>Model </a:t>
+            </a:r>
+            <a:r>
+              <a:rPr lang="en-US" dirty="0" err="1" smtClean="0"/>
+              <a:t>penyimpanan</a:t>
+            </a:r>
+            <a:r>
+              <a:rPr lang="en-US" dirty="0" smtClean="0"/>
+              <a:t> data yang </a:t>
+            </a:r>
+            <a:r>
+              <a:rPr lang="en-US" dirty="0" err="1" smtClean="0"/>
+              <a:t>tidak</a:t>
+            </a:r>
+            <a:r>
+              <a:rPr lang="en-US" dirty="0" smtClean="0"/>
+              <a:t> </a:t>
+            </a:r>
+            <a:r>
+              <a:rPr lang="en-US" dirty="0" err="1" smtClean="0"/>
+              <a:t>baik</a:t>
+            </a:r>
+            <a:endParaRPr lang="en-US" dirty="0" smtClean="0"/>
+          </a:p>
+          <a:p>
+            <a:pPr marL="457200" indent="-457200">
+              <a:buFont typeface="+mj-lt"/>
+              <a:buAutoNum type="arabicPeriod"/>
+            </a:pPr>
+            <a:r>
+              <a:rPr lang="en-US" dirty="0" err="1" smtClean="0"/>
+              <a:t>Isu</a:t>
+            </a:r>
+            <a:r>
+              <a:rPr lang="en-US" dirty="0" smtClean="0"/>
+              <a:t> </a:t>
+            </a:r>
+            <a:r>
+              <a:rPr lang="en-US" dirty="0" err="1" smtClean="0"/>
+              <a:t>keamanan</a:t>
+            </a:r>
+            <a:r>
+              <a:rPr lang="en-US" dirty="0" smtClean="0"/>
+              <a:t> yang </a:t>
+            </a:r>
+            <a:r>
+              <a:rPr lang="en-US" dirty="0" err="1" smtClean="0"/>
+              <a:t>tinggi</a:t>
+            </a:r>
+            <a:endParaRPr lang="en-US" dirty="0" smtClean="0"/>
+          </a:p>
+          <a:p>
+            <a:pPr marL="457200" indent="-457200">
+              <a:buFont typeface="+mj-lt"/>
+              <a:buAutoNum type="arabicPeriod"/>
+            </a:pPr>
+            <a:r>
+              <a:rPr lang="en-US" dirty="0" err="1" smtClean="0"/>
+              <a:t>Sistem</a:t>
+            </a:r>
+            <a:r>
+              <a:rPr lang="en-US" dirty="0" smtClean="0"/>
+              <a:t> </a:t>
+            </a:r>
+            <a:r>
+              <a:rPr lang="en-US" dirty="0" err="1" smtClean="0"/>
+              <a:t>tidak</a:t>
+            </a:r>
+            <a:r>
+              <a:rPr lang="en-US" dirty="0" smtClean="0"/>
+              <a:t> </a:t>
+            </a:r>
+            <a:r>
+              <a:rPr lang="en-US" dirty="0" err="1" smtClean="0"/>
+              <a:t>memberikan</a:t>
+            </a:r>
+            <a:r>
+              <a:rPr lang="en-US" dirty="0" smtClean="0"/>
+              <a:t> </a:t>
+            </a:r>
+            <a:r>
+              <a:rPr lang="en-US" dirty="0" err="1" smtClean="0"/>
+              <a:t>performa</a:t>
+            </a:r>
+            <a:r>
+              <a:rPr lang="en-US" dirty="0" smtClean="0"/>
+              <a:t> yang </a:t>
+            </a:r>
+            <a:r>
+              <a:rPr lang="en-US" dirty="0" err="1" smtClean="0"/>
+              <a:t>cukup</a:t>
+            </a:r>
+            <a:r>
+              <a:rPr lang="en-US" dirty="0" smtClean="0"/>
+              <a:t> </a:t>
+            </a:r>
+            <a:r>
+              <a:rPr lang="en-US" dirty="0" err="1" smtClean="0"/>
+              <a:t>baik</a:t>
+            </a:r>
+            <a:r>
+              <a:rPr lang="en-US" dirty="0" smtClean="0"/>
+              <a:t> </a:t>
+            </a:r>
+            <a:r>
+              <a:rPr lang="en-US" dirty="0" err="1" smtClean="0"/>
+              <a:t>ketika</a:t>
+            </a:r>
+            <a:r>
+              <a:rPr lang="en-US" dirty="0" smtClean="0"/>
+              <a:t> </a:t>
+            </a:r>
+            <a:r>
+              <a:rPr lang="en-US" dirty="0" err="1" smtClean="0"/>
+              <a:t>menangani</a:t>
+            </a:r>
+            <a:r>
+              <a:rPr lang="en-US" dirty="0" smtClean="0"/>
+              <a:t> </a:t>
+            </a:r>
+            <a:r>
+              <a:rPr lang="en-US" dirty="0" err="1" smtClean="0"/>
+              <a:t>banyak</a:t>
+            </a:r>
+            <a:r>
+              <a:rPr lang="en-US" dirty="0" smtClean="0"/>
+              <a:t> user</a:t>
+            </a:r>
             <a:endParaRPr lang="en-US" dirty="0"/>
           </a:p>
         </p:txBody>
@@ -26508,7 +27171,7 @@
     </p:spTree>
     <p:extLst>
       <p:ext uri="{BB962C8B-B14F-4D97-AF65-F5344CB8AC3E}">
-        <p14:creationId xmlns:p14="http://schemas.microsoft.com/office/powerpoint/2010/main" val="3123530275"/>
+        <p14:creationId xmlns:p14="http://schemas.microsoft.com/office/powerpoint/2010/main" val="3299405687"/>
       </p:ext>
     </p:extLst>
   </p:cSld>
@@ -26554,54 +27217,296 @@
               <a:rPr lang="en-US" dirty="0" err="1" smtClean="0"/>
               <a:t>Perancangan</a:t>
             </a:r>
-            <a:r>
-              <a:rPr lang="en-US" dirty="0" smtClean="0"/>
-              <a:t> </a:t>
-            </a:r>
-            <a:r>
-              <a:rPr lang="en-US" dirty="0" err="1" smtClean="0"/>
-              <a:t>modul</a:t>
-            </a:r>
             <a:endParaRPr lang="en-US" dirty="0"/>
           </a:p>
         </p:txBody>
       </p:sp>
-      <p:pic>
-        <p:nvPicPr>
-          <p:cNvPr id="4" name="Content Placeholder 3"/>
-          <p:cNvPicPr>
-            <a:picLocks noGrp="1"/>
-          </p:cNvPicPr>
+      <p:sp>
+        <p:nvSpPr>
+          <p:cNvPr id="3" name="Content Placeholder 2"/>
+          <p:cNvSpPr>
+            <a:spLocks noGrp="1"/>
+          </p:cNvSpPr>
           <p:nvPr>
             <p:ph idx="1"/>
           </p:nvPr>
-        </p:nvPicPr>
-        <p:blipFill>
-          <a:blip r:embed="rId2">
-            <a:extLst>
-              <a:ext uri="{28A0092B-C50C-407E-A947-70E740481C1C}">
-                <a14:useLocalDpi xmlns:a14="http://schemas.microsoft.com/office/drawing/2010/main" val="0"/>
-              </a:ext>
-            </a:extLst>
-          </a:blip>
-          <a:stretch>
-            <a:fillRect/>
-          </a:stretch>
-        </p:blipFill>
-        <p:spPr>
-          <a:xfrm>
-            <a:off x="3777022" y="1671850"/>
-            <a:ext cx="4397987" cy="4838132"/>
-          </a:xfrm>
-          <a:prstGeom prst="rect">
-            <a:avLst/>
-          </a:prstGeom>
-        </p:spPr>
-      </p:pic>
+        </p:nvSpPr>
+        <p:spPr/>
+        <p:txBody>
+          <a:bodyPr/>
+          <a:lstStyle/>
+          <a:p>
+            <a:pPr marL="0" indent="0">
+              <a:buNone/>
+            </a:pPr>
+            <a:r>
+              <a:rPr lang="en-US" dirty="0" err="1" smtClean="0"/>
+              <a:t>Perancangan</a:t>
+            </a:r>
+            <a:r>
+              <a:rPr lang="en-US" dirty="0" smtClean="0"/>
+              <a:t> </a:t>
+            </a:r>
+            <a:r>
+              <a:rPr lang="en-US" dirty="0" err="1" smtClean="0"/>
+              <a:t>arsitektur</a:t>
+            </a:r>
+            <a:r>
+              <a:rPr lang="en-US" dirty="0" smtClean="0"/>
+              <a:t> yang </a:t>
+            </a:r>
+            <a:r>
+              <a:rPr lang="en-US" dirty="0" err="1" smtClean="0"/>
+              <a:t>baru</a:t>
+            </a:r>
+            <a:r>
+              <a:rPr lang="en-US" dirty="0" smtClean="0"/>
+              <a:t> </a:t>
+            </a:r>
+            <a:r>
+              <a:rPr lang="en-US" dirty="0" err="1" smtClean="0"/>
+              <a:t>tidak</a:t>
+            </a:r>
+            <a:r>
+              <a:rPr lang="en-US" dirty="0" smtClean="0"/>
+              <a:t> </a:t>
+            </a:r>
+            <a:r>
+              <a:rPr lang="en-US" dirty="0" err="1" smtClean="0"/>
+              <a:t>sepenuhnya</a:t>
+            </a:r>
+            <a:r>
+              <a:rPr lang="en-US" dirty="0" smtClean="0"/>
+              <a:t> </a:t>
+            </a:r>
+            <a:r>
+              <a:rPr lang="en-US" dirty="0" err="1" smtClean="0"/>
+              <a:t>dibentuk</a:t>
+            </a:r>
+            <a:r>
+              <a:rPr lang="en-US" dirty="0" smtClean="0"/>
+              <a:t> </a:t>
+            </a:r>
+            <a:r>
+              <a:rPr lang="en-US" dirty="0" err="1" smtClean="0"/>
+              <a:t>kembali</a:t>
+            </a:r>
+            <a:r>
+              <a:rPr lang="en-US" dirty="0" smtClean="0"/>
+              <a:t> </a:t>
+            </a:r>
+            <a:r>
+              <a:rPr lang="en-US" dirty="0" err="1" smtClean="0"/>
+              <a:t>dari</a:t>
+            </a:r>
+            <a:r>
+              <a:rPr lang="en-US" dirty="0" smtClean="0"/>
+              <a:t> </a:t>
+            </a:r>
+            <a:r>
+              <a:rPr lang="en-US" dirty="0" err="1" smtClean="0"/>
+              <a:t>awal</a:t>
+            </a:r>
+            <a:r>
+              <a:rPr lang="en-US" dirty="0" smtClean="0"/>
+              <a:t>. Proses </a:t>
+            </a:r>
+            <a:r>
+              <a:rPr lang="en-US" dirty="0" err="1" smtClean="0"/>
+              <a:t>bisnis</a:t>
+            </a:r>
+            <a:r>
+              <a:rPr lang="en-US" dirty="0" smtClean="0"/>
+              <a:t> </a:t>
+            </a:r>
+            <a:r>
+              <a:rPr lang="en-US" dirty="0" err="1" smtClean="0"/>
+              <a:t>dan</a:t>
+            </a:r>
+            <a:r>
+              <a:rPr lang="en-US" dirty="0" smtClean="0"/>
+              <a:t> method yang </a:t>
+            </a:r>
+            <a:r>
+              <a:rPr lang="en-US" dirty="0" err="1" smtClean="0"/>
+              <a:t>digunakan</a:t>
+            </a:r>
+            <a:r>
+              <a:rPr lang="en-US" dirty="0" smtClean="0"/>
+              <a:t> </a:t>
+            </a:r>
+            <a:r>
+              <a:rPr lang="en-US" dirty="0" err="1" smtClean="0"/>
+              <a:t>adalah</a:t>
+            </a:r>
+            <a:r>
+              <a:rPr lang="en-US" dirty="0" smtClean="0"/>
+              <a:t> </a:t>
+            </a:r>
+            <a:r>
+              <a:rPr lang="en-US" dirty="0" err="1" smtClean="0"/>
+              <a:t>sama</a:t>
+            </a:r>
+            <a:r>
+              <a:rPr lang="en-US" dirty="0" smtClean="0"/>
+              <a:t> </a:t>
+            </a:r>
+            <a:r>
+              <a:rPr lang="en-US" dirty="0" err="1" smtClean="0"/>
+              <a:t>seperti</a:t>
+            </a:r>
+            <a:r>
+              <a:rPr lang="en-US" dirty="0" smtClean="0"/>
+              <a:t> yang </a:t>
+            </a:r>
+            <a:r>
+              <a:rPr lang="en-US" dirty="0" err="1" smtClean="0"/>
+              <a:t>ada</a:t>
+            </a:r>
+            <a:r>
+              <a:rPr lang="en-US" dirty="0" smtClean="0"/>
+              <a:t> </a:t>
+            </a:r>
+            <a:r>
+              <a:rPr lang="en-US" dirty="0" err="1" smtClean="0"/>
+              <a:t>pada</a:t>
+            </a:r>
+            <a:r>
+              <a:rPr lang="en-US" dirty="0" smtClean="0"/>
+              <a:t> </a:t>
+            </a:r>
+            <a:r>
+              <a:rPr lang="en-US" dirty="0" err="1" smtClean="0"/>
+              <a:t>arsitektur</a:t>
+            </a:r>
+            <a:r>
+              <a:rPr lang="en-US" dirty="0" smtClean="0"/>
+              <a:t> </a:t>
+            </a:r>
+            <a:r>
+              <a:rPr lang="en-US" dirty="0" err="1" smtClean="0"/>
+              <a:t>sebelumnya</a:t>
+            </a:r>
+            <a:r>
+              <a:rPr lang="en-US" dirty="0" smtClean="0"/>
+              <a:t>.</a:t>
+            </a:r>
+          </a:p>
+          <a:p>
+            <a:pPr marL="0" indent="0">
+              <a:buNone/>
+            </a:pPr>
+            <a:r>
+              <a:rPr lang="en-US" dirty="0" err="1" smtClean="0"/>
+              <a:t>Pada</a:t>
+            </a:r>
+            <a:r>
+              <a:rPr lang="en-US" dirty="0" smtClean="0"/>
+              <a:t> </a:t>
+            </a:r>
+            <a:r>
+              <a:rPr lang="en-US" dirty="0" err="1" smtClean="0"/>
+              <a:t>dekomposisi</a:t>
+            </a:r>
+            <a:r>
+              <a:rPr lang="en-US" dirty="0" smtClean="0"/>
+              <a:t> service, </a:t>
+            </a:r>
+            <a:r>
+              <a:rPr lang="en-US" dirty="0" err="1" smtClean="0"/>
+              <a:t>penyusunan</a:t>
+            </a:r>
+            <a:r>
+              <a:rPr lang="en-US" dirty="0" smtClean="0"/>
+              <a:t> service </a:t>
+            </a:r>
+            <a:r>
+              <a:rPr lang="en-US" dirty="0" err="1" smtClean="0"/>
+              <a:t>dapat</a:t>
+            </a:r>
+            <a:r>
+              <a:rPr lang="en-US" dirty="0" smtClean="0"/>
+              <a:t> </a:t>
+            </a:r>
+            <a:r>
+              <a:rPr lang="en-US" dirty="0" err="1" smtClean="0"/>
+              <a:t>dibentuk</a:t>
+            </a:r>
+            <a:r>
+              <a:rPr lang="en-US" dirty="0" smtClean="0"/>
+              <a:t> </a:t>
+            </a:r>
+            <a:r>
+              <a:rPr lang="en-US" dirty="0" err="1" smtClean="0"/>
+              <a:t>berdasarkan</a:t>
+            </a:r>
+            <a:r>
+              <a:rPr lang="en-US" dirty="0" smtClean="0"/>
+              <a:t> </a:t>
+            </a:r>
+            <a:r>
+              <a:rPr lang="en-US" dirty="0" err="1" smtClean="0"/>
+              <a:t>modul</a:t>
+            </a:r>
+            <a:r>
+              <a:rPr lang="en-US" dirty="0" smtClean="0"/>
+              <a:t> </a:t>
+            </a:r>
+            <a:r>
+              <a:rPr lang="en-US" dirty="0" err="1" smtClean="0"/>
+              <a:t>bisnis</a:t>
+            </a:r>
+            <a:r>
+              <a:rPr lang="en-US" dirty="0" smtClean="0"/>
+              <a:t> yang </a:t>
+            </a:r>
+            <a:r>
+              <a:rPr lang="en-US" dirty="0" err="1" smtClean="0"/>
+              <a:t>sudah</a:t>
+            </a:r>
+            <a:r>
+              <a:rPr lang="en-US" dirty="0" smtClean="0"/>
+              <a:t> </a:t>
+            </a:r>
+            <a:r>
+              <a:rPr lang="en-US" dirty="0" err="1" smtClean="0"/>
+              <a:t>ada</a:t>
+            </a:r>
+            <a:r>
+              <a:rPr lang="en-US" dirty="0" smtClean="0"/>
+              <a:t> </a:t>
+            </a:r>
+            <a:r>
+              <a:rPr lang="en-US" dirty="0" err="1" smtClean="0"/>
+              <a:t>pada</a:t>
+            </a:r>
+            <a:r>
+              <a:rPr lang="en-US" dirty="0" smtClean="0"/>
+              <a:t> </a:t>
+            </a:r>
+            <a:r>
+              <a:rPr lang="en-US" dirty="0" err="1" smtClean="0"/>
+              <a:t>arsitektur</a:t>
+            </a:r>
+            <a:r>
+              <a:rPr lang="en-US" dirty="0" smtClean="0"/>
+              <a:t> </a:t>
+            </a:r>
+            <a:r>
+              <a:rPr lang="en-US" dirty="0" err="1" smtClean="0"/>
+              <a:t>sebelumnya</a:t>
+            </a:r>
+            <a:r>
+              <a:rPr lang="en-US" dirty="0" smtClean="0"/>
+              <a:t>.</a:t>
+            </a:r>
+          </a:p>
+        </p:txBody>
+      </p:sp>
     </p:spTree>
     <p:extLst>
       <p:ext uri="{BB962C8B-B14F-4D97-AF65-F5344CB8AC3E}">
-        <p14:creationId xmlns:p14="http://schemas.microsoft.com/office/powerpoint/2010/main" val="1833181741"/>
+        <p14:creationId xmlns:p14="http://schemas.microsoft.com/office/powerpoint/2010/main" val="3123530275"/>
       </p:ext>
     </p:extLst>
   </p:cSld>
@@ -26645,256 +27550,56 @@
           <a:p>
             <a:r>
               <a:rPr lang="en-US" dirty="0" err="1" smtClean="0"/>
-              <a:t>perancangan</a:t>
+              <a:t>Perancangan</a:t>
+            </a:r>
+            <a:r>
+              <a:rPr lang="en-US" dirty="0" smtClean="0"/>
+              <a:t> </a:t>
+            </a:r>
+            <a:r>
+              <a:rPr lang="en-US" dirty="0" err="1" smtClean="0"/>
+              <a:t>modul</a:t>
             </a:r>
             <a:endParaRPr lang="en-US" dirty="0"/>
           </a:p>
         </p:txBody>
       </p:sp>
-      <p:sp>
-        <p:nvSpPr>
-          <p:cNvPr id="3" name="Content Placeholder 2"/>
-          <p:cNvSpPr>
-            <a:spLocks noGrp="1"/>
-          </p:cNvSpPr>
+      <p:pic>
+        <p:nvPicPr>
+          <p:cNvPr id="5" name="Content Placeholder 4"/>
+          <p:cNvPicPr>
+            <a:picLocks noGrp="1"/>
+          </p:cNvPicPr>
           <p:nvPr>
             <p:ph idx="1"/>
           </p:nvPr>
-        </p:nvSpPr>
-        <p:spPr/>
-        <p:txBody>
-          <a:bodyPr/>
-          <a:lstStyle/>
-          <a:p>
-            <a:pPr marL="457200" indent="-457200">
-              <a:buFont typeface="+mj-lt"/>
-              <a:buAutoNum type="arabicPeriod"/>
-            </a:pPr>
-            <a:r>
-              <a:rPr lang="en-US" dirty="0" smtClean="0"/>
-              <a:t>Model </a:t>
-            </a:r>
-            <a:r>
-              <a:rPr lang="en-US" dirty="0" err="1" smtClean="0"/>
-              <a:t>penyimpanan</a:t>
-            </a:r>
-            <a:r>
-              <a:rPr lang="en-US" dirty="0" smtClean="0"/>
-              <a:t> data : Database per service.</a:t>
-            </a:r>
-          </a:p>
-          <a:p>
-            <a:pPr marL="457200" indent="-457200">
-              <a:buFont typeface="+mj-lt"/>
-              <a:buAutoNum type="arabicPeriod"/>
-            </a:pPr>
-            <a:r>
-              <a:rPr lang="en-US" dirty="0" err="1" smtClean="0"/>
-              <a:t>Pemilihan</a:t>
-            </a:r>
-            <a:r>
-              <a:rPr lang="en-US" dirty="0" smtClean="0"/>
-              <a:t> server basis data : PostgreSQL &amp; MongoDB (</a:t>
-            </a:r>
-            <a:r>
-              <a:rPr lang="en-US" dirty="0" err="1" smtClean="0"/>
-              <a:t>untuk</a:t>
-            </a:r>
-            <a:r>
-              <a:rPr lang="en-US" dirty="0" smtClean="0"/>
-              <a:t> </a:t>
-            </a:r>
-            <a:r>
-              <a:rPr lang="en-US" dirty="0" err="1" smtClean="0"/>
-              <a:t>kasus</a:t>
-            </a:r>
-            <a:r>
-              <a:rPr lang="en-US" dirty="0" smtClean="0"/>
-              <a:t> </a:t>
-            </a:r>
-            <a:r>
-              <a:rPr lang="en-US" dirty="0" err="1" smtClean="0"/>
-              <a:t>penyimpanan</a:t>
-            </a:r>
-            <a:r>
-              <a:rPr lang="en-US" dirty="0" smtClean="0"/>
-              <a:t> multimedia, </a:t>
-            </a:r>
-            <a:r>
-              <a:rPr lang="en-US" dirty="0" err="1" smtClean="0"/>
-              <a:t>karena</a:t>
-            </a:r>
-            <a:r>
-              <a:rPr lang="en-US" dirty="0" smtClean="0"/>
-              <a:t> </a:t>
-            </a:r>
-            <a:r>
-              <a:rPr lang="en-US" dirty="0" err="1" smtClean="0"/>
-              <a:t>dinilai</a:t>
-            </a:r>
-            <a:r>
-              <a:rPr lang="en-US" dirty="0" smtClean="0"/>
-              <a:t> </a:t>
-            </a:r>
-            <a:r>
-              <a:rPr lang="en-US" dirty="0" err="1" smtClean="0"/>
-              <a:t>mudah</a:t>
-            </a:r>
-            <a:r>
-              <a:rPr lang="en-US" dirty="0" smtClean="0"/>
-              <a:t>, </a:t>
-            </a:r>
-            <a:r>
-              <a:rPr lang="en-US" dirty="0" err="1" smtClean="0"/>
-              <a:t>cepat</a:t>
-            </a:r>
-            <a:r>
-              <a:rPr lang="en-US" dirty="0" smtClean="0"/>
-              <a:t>, </a:t>
-            </a:r>
-            <a:r>
-              <a:rPr lang="en-US" dirty="0" err="1" smtClean="0"/>
-              <a:t>dan</a:t>
-            </a:r>
-            <a:r>
-              <a:rPr lang="en-US" dirty="0" smtClean="0"/>
-              <a:t> </a:t>
-            </a:r>
-            <a:r>
-              <a:rPr lang="en-US" i="1" dirty="0" smtClean="0"/>
-              <a:t>open source).</a:t>
-            </a:r>
-          </a:p>
-          <a:p>
-            <a:pPr marL="457200" indent="-457200">
-              <a:buFont typeface="+mj-lt"/>
-              <a:buAutoNum type="arabicPeriod"/>
-            </a:pPr>
-            <a:r>
-              <a:rPr lang="en-US" dirty="0" err="1" smtClean="0"/>
-              <a:t>Komunikasi</a:t>
-            </a:r>
-            <a:r>
-              <a:rPr lang="en-US" dirty="0" smtClean="0"/>
-              <a:t> </a:t>
-            </a:r>
-            <a:r>
-              <a:rPr lang="en-US" dirty="0" err="1" smtClean="0"/>
-              <a:t>antar</a:t>
-            </a:r>
-            <a:r>
-              <a:rPr lang="en-US" dirty="0" smtClean="0"/>
-              <a:t> service : </a:t>
-            </a:r>
-            <a:r>
-              <a:rPr lang="en-US" i="1" dirty="0" smtClean="0"/>
-              <a:t>Web-service REST API </a:t>
-            </a:r>
-            <a:r>
-              <a:rPr lang="en-US" dirty="0" err="1" smtClean="0"/>
-              <a:t>dengan</a:t>
-            </a:r>
-            <a:r>
-              <a:rPr lang="en-US" dirty="0" smtClean="0"/>
-              <a:t> </a:t>
-            </a:r>
-            <a:r>
-              <a:rPr lang="en-US" dirty="0" err="1" smtClean="0"/>
-              <a:t>fomat</a:t>
-            </a:r>
-            <a:r>
-              <a:rPr lang="en-US" dirty="0" smtClean="0"/>
-              <a:t> data JSON</a:t>
-            </a:r>
-            <a:r>
-              <a:rPr lang="en-US" i="1" dirty="0" smtClean="0"/>
-              <a:t>.</a:t>
-            </a:r>
-            <a:endParaRPr lang="en-US" dirty="0" smtClean="0"/>
-          </a:p>
-          <a:p>
-            <a:pPr marL="457200" indent="-457200">
-              <a:buFont typeface="+mj-lt"/>
-              <a:buAutoNum type="arabicPeriod"/>
-            </a:pPr>
-            <a:r>
-              <a:rPr lang="en-US" dirty="0" err="1" smtClean="0"/>
-              <a:t>Rancangan</a:t>
-            </a:r>
-            <a:r>
-              <a:rPr lang="en-US" dirty="0" smtClean="0"/>
-              <a:t> deployment : </a:t>
-            </a:r>
-            <a:r>
-              <a:rPr lang="en-US" dirty="0" err="1" smtClean="0"/>
-              <a:t>Mulitple</a:t>
-            </a:r>
-            <a:r>
-              <a:rPr lang="en-US" dirty="0" smtClean="0"/>
-              <a:t> service per host </a:t>
-            </a:r>
-            <a:r>
-              <a:rPr lang="en-US" dirty="0" err="1" smtClean="0"/>
-              <a:t>dalam</a:t>
-            </a:r>
-            <a:r>
-              <a:rPr lang="en-US" dirty="0" smtClean="0"/>
-              <a:t> </a:t>
-            </a:r>
-            <a:r>
-              <a:rPr lang="en-US" dirty="0" err="1" smtClean="0"/>
-              <a:t>beberapa</a:t>
-            </a:r>
-            <a:r>
-              <a:rPr lang="en-US" dirty="0" smtClean="0"/>
-              <a:t> host (server).</a:t>
-            </a:r>
-          </a:p>
-          <a:p>
-            <a:pPr marL="457200" indent="-457200">
-              <a:buFont typeface="+mj-lt"/>
-              <a:buAutoNum type="arabicPeriod"/>
-            </a:pPr>
-            <a:r>
-              <a:rPr lang="en-US" dirty="0" err="1" smtClean="0"/>
-              <a:t>Pengujian</a:t>
-            </a:r>
-            <a:r>
-              <a:rPr lang="en-US" dirty="0" smtClean="0"/>
-              <a:t> : Test-plan </a:t>
-            </a:r>
-            <a:r>
-              <a:rPr lang="en-US" dirty="0" err="1" smtClean="0"/>
-              <a:t>dan</a:t>
-            </a:r>
-            <a:r>
-              <a:rPr lang="en-US" dirty="0" smtClean="0"/>
-              <a:t> </a:t>
-            </a:r>
-            <a:r>
-              <a:rPr lang="en-US" dirty="0" err="1" smtClean="0"/>
-              <a:t>didokumentasikan</a:t>
-            </a:r>
-            <a:r>
-              <a:rPr lang="en-US" dirty="0" smtClean="0"/>
-              <a:t> </a:t>
-            </a:r>
-            <a:r>
-              <a:rPr lang="en-US" dirty="0" err="1" smtClean="0"/>
-              <a:t>dalam</a:t>
-            </a:r>
-            <a:r>
-              <a:rPr lang="en-US" dirty="0" smtClean="0"/>
-              <a:t> traceability matrix.</a:t>
-            </a:r>
-            <a:endParaRPr lang="en-US" dirty="0"/>
-          </a:p>
-        </p:txBody>
-      </p:sp>
+        </p:nvPicPr>
+        <p:blipFill>
+          <a:blip r:embed="rId2">
+            <a:extLst>
+              <a:ext uri="{28A0092B-C50C-407E-A947-70E740481C1C}">
+                <a14:useLocalDpi xmlns:a14="http://schemas.microsoft.com/office/drawing/2010/main" val="0"/>
+              </a:ext>
+            </a:extLst>
+          </a:blip>
+          <a:stretch>
+            <a:fillRect/>
+          </a:stretch>
+        </p:blipFill>
+        <p:spPr>
+          <a:xfrm>
+            <a:off x="3274220" y="1676400"/>
+            <a:ext cx="5388517" cy="5029200"/>
+          </a:xfrm>
+          <a:prstGeom prst="rect">
+            <a:avLst/>
+          </a:prstGeom>
+        </p:spPr>
+      </p:pic>
     </p:spTree>
     <p:extLst>
       <p:ext uri="{BB962C8B-B14F-4D97-AF65-F5344CB8AC3E}">
-        <p14:creationId xmlns:p14="http://schemas.microsoft.com/office/powerpoint/2010/main" val="886435063"/>
+        <p14:creationId xmlns:p14="http://schemas.microsoft.com/office/powerpoint/2010/main" val="1833181741"/>
       </p:ext>
     </p:extLst>
   </p:cSld>
@@ -26938,15 +27643,7 @@
           <a:p>
             <a:r>
               <a:rPr lang="en-US" dirty="0" err="1" smtClean="0"/>
-              <a:t>Batasan</a:t>
-            </a:r>
-            <a:r>
-              <a:rPr lang="en-US" dirty="0" smtClean="0"/>
-              <a:t> </a:t>
-            </a:r>
-            <a:r>
-              <a:rPr lang="en-US" dirty="0" err="1" smtClean="0"/>
-              <a:t>implementasi</a:t>
+              <a:t>perancangan</a:t>
             </a:r>
             <a:endParaRPr lang="en-US" dirty="0"/>
           </a:p>
@@ -26973,35 +27670,143 @@
             </a:pPr>
             <a:r>
               <a:rPr lang="en-US" dirty="0" smtClean="0"/>
-              <a:t>Server yang </a:t>
-            </a:r>
-            <a:r>
-              <a:rPr lang="en-US" dirty="0" err="1" smtClean="0"/>
-              <a:t>tersedia</a:t>
-            </a:r>
-            <a:r>
-              <a:rPr lang="en-US" dirty="0" smtClean="0"/>
-              <a:t> </a:t>
-            </a:r>
-            <a:r>
-              <a:rPr lang="en-US" dirty="0" err="1" smtClean="0"/>
-              <a:t>hanya</a:t>
-            </a:r>
-            <a:r>
-              <a:rPr lang="en-US" dirty="0" smtClean="0"/>
-              <a:t> </a:t>
-            </a:r>
-            <a:r>
-              <a:rPr lang="en-US" dirty="0" err="1" smtClean="0"/>
-              <a:t>terdapat</a:t>
-            </a:r>
-            <a:r>
-              <a:rPr lang="en-US" dirty="0" smtClean="0"/>
-              <a:t> 2 </a:t>
-            </a:r>
-            <a:r>
-              <a:rPr lang="en-US" dirty="0" err="1" smtClean="0"/>
-              <a:t>buah</a:t>
+              <a:t>Model </a:t>
+            </a:r>
+            <a:r>
+              <a:rPr lang="en-US" dirty="0" err="1" smtClean="0"/>
+              <a:t>penyimpanan</a:t>
+            </a:r>
+            <a:r>
+              <a:rPr lang="en-US" dirty="0" smtClean="0"/>
+              <a:t> data : Database per service.</a:t>
+            </a:r>
+          </a:p>
+          <a:p>
+            <a:pPr marL="457200" indent="-457200">
+              <a:buFont typeface="+mj-lt"/>
+              <a:buAutoNum type="arabicPeriod"/>
+            </a:pPr>
+            <a:r>
+              <a:rPr lang="en-US" dirty="0" err="1" smtClean="0"/>
+              <a:t>Pemilihan</a:t>
+            </a:r>
+            <a:r>
+              <a:rPr lang="en-US" dirty="0" smtClean="0"/>
+              <a:t> server basis data : PostgreSQL &amp; MongoDB (</a:t>
+            </a:r>
+            <a:r>
+              <a:rPr lang="en-US" dirty="0" err="1" smtClean="0"/>
+              <a:t>untuk</a:t>
+            </a:r>
+            <a:r>
+              <a:rPr lang="en-US" dirty="0" smtClean="0"/>
+              <a:t> </a:t>
+            </a:r>
+            <a:r>
+              <a:rPr lang="en-US" dirty="0" err="1" smtClean="0"/>
+              <a:t>kasus</a:t>
+            </a:r>
+            <a:r>
+              <a:rPr lang="en-US" dirty="0" smtClean="0"/>
+              <a:t> </a:t>
+            </a:r>
+            <a:r>
+              <a:rPr lang="en-US" dirty="0" err="1" smtClean="0"/>
+              <a:t>penyimpanan</a:t>
+            </a:r>
+            <a:r>
+              <a:rPr lang="en-US" dirty="0" smtClean="0"/>
+              <a:t> multimedia, </a:t>
+            </a:r>
+            <a:r>
+              <a:rPr lang="en-US" dirty="0" err="1" smtClean="0"/>
+              <a:t>karena</a:t>
+            </a:r>
+            <a:r>
+              <a:rPr lang="en-US" dirty="0" smtClean="0"/>
+              <a:t> </a:t>
+            </a:r>
+            <a:r>
+              <a:rPr lang="en-US" dirty="0" err="1" smtClean="0"/>
+              <a:t>dinilai</a:t>
+            </a:r>
+            <a:r>
+              <a:rPr lang="en-US" dirty="0" smtClean="0"/>
+              <a:t> </a:t>
+            </a:r>
+            <a:r>
+              <a:rPr lang="en-US" dirty="0" err="1" smtClean="0"/>
+              <a:t>mudah</a:t>
+            </a:r>
+            <a:r>
+              <a:rPr lang="en-US" dirty="0" smtClean="0"/>
+              <a:t>, </a:t>
+            </a:r>
+            <a:r>
+              <a:rPr lang="en-US" dirty="0" err="1" smtClean="0"/>
+              <a:t>cepat</a:t>
+            </a:r>
+            <a:r>
+              <a:rPr lang="en-US" dirty="0" smtClean="0"/>
+              <a:t>, </a:t>
+            </a:r>
+            <a:r>
+              <a:rPr lang="en-US" dirty="0" err="1" smtClean="0"/>
+              <a:t>dan</a:t>
+            </a:r>
+            <a:r>
+              <a:rPr lang="en-US" dirty="0" smtClean="0"/>
+              <a:t> </a:t>
+            </a:r>
+            <a:r>
+              <a:rPr lang="en-US" i="1" dirty="0" smtClean="0"/>
+              <a:t>open source).</a:t>
+            </a:r>
+          </a:p>
+          <a:p>
+            <a:pPr marL="457200" indent="-457200">
+              <a:buFont typeface="+mj-lt"/>
+              <a:buAutoNum type="arabicPeriod"/>
+            </a:pPr>
+            <a:r>
+              <a:rPr lang="en-US" dirty="0" err="1" smtClean="0"/>
+              <a:t>Komunikasi</a:t>
+            </a:r>
+            <a:r>
+              <a:rPr lang="en-US" dirty="0" smtClean="0"/>
+              <a:t> </a:t>
+            </a:r>
+            <a:r>
+              <a:rPr lang="en-US" dirty="0" err="1" smtClean="0"/>
+              <a:t>antar</a:t>
+            </a:r>
+            <a:r>
+              <a:rPr lang="en-US" dirty="0" smtClean="0"/>
+              <a:t> service : </a:t>
+            </a:r>
+            <a:r>
+              <a:rPr lang="en-US" i="1" dirty="0" smtClean="0"/>
+              <a:t>RESTful Web-service </a:t>
+            </a:r>
+            <a:r>
+              <a:rPr lang="en-US" dirty="0" err="1" smtClean="0"/>
+              <a:t>dengan</a:t>
+            </a:r>
+            <a:r>
+              <a:rPr lang="en-US" dirty="0" smtClean="0"/>
+              <a:t> </a:t>
+            </a:r>
+            <a:r>
+              <a:rPr lang="en-US" dirty="0" err="1" smtClean="0"/>
+              <a:t>fomat</a:t>
+            </a:r>
+            <a:r>
+              <a:rPr lang="en-US" dirty="0" smtClean="0"/>
+              <a:t> data JSON</a:t>
+            </a:r>
+            <a:r>
+              <a:rPr lang="en-US" i="1" dirty="0" smtClean="0"/>
+              <a:t>.</a:t>
             </a:r>
             <a:endParaRPr lang="en-US" dirty="0" smtClean="0"/>
           </a:p>
@@ -27011,16 +27816,20 @@
               <a:buAutoNum type="arabicPeriod"/>
             </a:pPr>
             <a:r>
-              <a:rPr lang="en-US" dirty="0" smtClean="0"/>
-              <a:t>Deployment yang </a:t>
-            </a:r>
-            <a:r>
-              <a:rPr lang="en-US" dirty="0" err="1" smtClean="0"/>
-              <a:t>dilakukan</a:t>
-            </a:r>
-            <a:r>
-              <a:rPr lang="en-US" dirty="0" smtClean="0"/>
-              <a:t> </a:t>
+              <a:rPr lang="en-US" dirty="0" err="1" smtClean="0"/>
+              <a:t>Rancangan</a:t>
+            </a:r>
+            <a:r>
+              <a:rPr lang="en-US" dirty="0" smtClean="0"/>
+              <a:t> deployment : </a:t>
+            </a:r>
+            <a:r>
+              <a:rPr lang="en-US" dirty="0" err="1" smtClean="0"/>
+              <a:t>Mulitple</a:t>
+            </a:r>
+            <a:r>
+              <a:rPr lang="en-US" dirty="0" smtClean="0"/>
+              <a:t> service per host </a:t>
             </a:r>
             <a:r>
               <a:rPr lang="en-US" dirty="0" err="1" smtClean="0"/>
@@ -27028,69 +27837,54 @@
             </a:r>
             <a:r>
               <a:rPr lang="en-US" dirty="0" smtClean="0"/>
-              <a:t> server local (</a:t>
-            </a:r>
-            <a:r>
-              <a:rPr lang="en-US" dirty="0" err="1" smtClean="0"/>
-              <a:t>komputer</a:t>
-            </a:r>
-            <a:r>
-              <a:rPr lang="en-US" dirty="0" smtClean="0"/>
-              <a:t> </a:t>
-            </a:r>
-            <a:r>
-              <a:rPr lang="en-US" dirty="0" err="1" smtClean="0"/>
-              <a:t>pribadi</a:t>
-            </a:r>
-            <a:r>
-              <a:rPr lang="en-US" dirty="0" smtClean="0"/>
-              <a:t>), </a:t>
-            </a:r>
-            <a:r>
-              <a:rPr lang="en-US" dirty="0" err="1" smtClean="0"/>
-              <a:t>harus</a:t>
-            </a:r>
-            <a:r>
-              <a:rPr lang="en-US" dirty="0" smtClean="0"/>
-              <a:t> </a:t>
-            </a:r>
-            <a:r>
-              <a:rPr lang="en-US" dirty="0" err="1" smtClean="0"/>
-              <a:t>dilakukan</a:t>
-            </a:r>
-            <a:r>
-              <a:rPr lang="en-US" dirty="0" smtClean="0"/>
-              <a:t> </a:t>
-            </a:r>
-            <a:r>
-              <a:rPr lang="en-US" dirty="0" err="1" smtClean="0"/>
-              <a:t>dibawah</a:t>
-            </a:r>
-            <a:r>
-              <a:rPr lang="en-US" dirty="0" smtClean="0"/>
-              <a:t> 1 </a:t>
-            </a:r>
-            <a:r>
-              <a:rPr lang="en-US" dirty="0" err="1" smtClean="0"/>
-              <a:t>jaringan</a:t>
-            </a:r>
-            <a:r>
-              <a:rPr lang="en-US" dirty="0" smtClean="0"/>
-              <a:t> yang </a:t>
-            </a:r>
-            <a:r>
-              <a:rPr lang="en-US" dirty="0" err="1" smtClean="0"/>
-              <a:t>sama</a:t>
-            </a:r>
-            <a:r>
-              <a:rPr lang="en-US" dirty="0" smtClean="0"/>
-              <a:t>.</a:t>
+              <a:t> </a:t>
+            </a:r>
+            <a:r>
+              <a:rPr lang="en-US" dirty="0" err="1" smtClean="0"/>
+              <a:t>beberapa</a:t>
+            </a:r>
+            <a:r>
+              <a:rPr lang="en-US" dirty="0" smtClean="0"/>
+              <a:t> host (server).</a:t>
             </a:r>
           </a:p>
           <a:p>
-            <a:pPr marL="0" indent="0">
-              <a:buNone/>
+            <a:pPr marL="457200" indent="-457200">
+              <a:buFont typeface="+mj-lt"/>
+              <a:buAutoNum type="arabicPeriod"/>
             </a:pPr>
+            <a:r>
+              <a:rPr lang="en-US" dirty="0" err="1" smtClean="0"/>
+              <a:t>Pengujian</a:t>
+            </a:r>
+            <a:r>
+              <a:rPr lang="en-US" dirty="0" smtClean="0"/>
+              <a:t> : Test-plan </a:t>
+            </a:r>
+            <a:r>
+              <a:rPr lang="en-US" dirty="0" err="1" smtClean="0"/>
+              <a:t>dan</a:t>
+            </a:r>
+            <a:r>
+              <a:rPr lang="en-US" dirty="0" smtClean="0"/>
+              <a:t> </a:t>
+            </a:r>
+            <a:r>
+              <a:rPr lang="en-US" dirty="0" err="1" smtClean="0"/>
+              <a:t>didokumentasikan</a:t>
+            </a:r>
+            <a:r>
+              <a:rPr lang="en-US" dirty="0" smtClean="0"/>
+              <a:t> </a:t>
+            </a:r>
+            <a:r>
+              <a:rPr lang="en-US" dirty="0" err="1" smtClean="0"/>
+              <a:t>dalam</a:t>
+            </a:r>
+            <a:r>
+              <a:rPr lang="en-US" dirty="0" smtClean="0"/>
+              <a:t> traceability matrix.</a:t>
+            </a:r>
             <a:endParaRPr lang="en-US" dirty="0"/>
           </a:p>
         </p:txBody>
@@ -27098,7 +27892,7 @@
     </p:spTree>
     <p:extLst>
       <p:ext uri="{BB962C8B-B14F-4D97-AF65-F5344CB8AC3E}">
-        <p14:creationId xmlns:p14="http://schemas.microsoft.com/office/powerpoint/2010/main" val="1721983042"/>
+        <p14:creationId xmlns:p14="http://schemas.microsoft.com/office/powerpoint/2010/main" val="886435063"/>
       </p:ext>
     </p:extLst>
   </p:cSld>
@@ -27142,6 +27936,204 @@
           <a:p>
             <a:r>
               <a:rPr lang="en-US" dirty="0" err="1" smtClean="0"/>
+              <a:t>Batasan</a:t>
+            </a:r>
+            <a:r>
+              <a:rPr lang="en-US" dirty="0" smtClean="0"/>
+              <a:t> </a:t>
+            </a:r>
+            <a:r>
+              <a:rPr lang="en-US" dirty="0" err="1" smtClean="0"/>
+              <a:t>implementasi</a:t>
+            </a:r>
+            <a:endParaRPr lang="en-US" dirty="0"/>
+          </a:p>
+        </p:txBody>
+      </p:sp>
+      <p:sp>
+        <p:nvSpPr>
+          <p:cNvPr id="3" name="Content Placeholder 2"/>
+          <p:cNvSpPr>
+            <a:spLocks noGrp="1"/>
+          </p:cNvSpPr>
+          <p:nvPr>
+            <p:ph idx="1"/>
+          </p:nvPr>
+        </p:nvSpPr>
+        <p:spPr/>
+        <p:txBody>
+          <a:bodyPr/>
+          <a:lstStyle/>
+          <a:p>
+            <a:pPr marL="457200" indent="-457200">
+              <a:buFont typeface="+mj-lt"/>
+              <a:buAutoNum type="arabicPeriod"/>
+            </a:pPr>
+            <a:r>
+              <a:rPr lang="en-US" dirty="0" smtClean="0"/>
+              <a:t>Server yang </a:t>
+            </a:r>
+            <a:r>
+              <a:rPr lang="en-US" dirty="0" err="1" smtClean="0"/>
+              <a:t>tersedia</a:t>
+            </a:r>
+            <a:r>
+              <a:rPr lang="en-US" dirty="0" smtClean="0"/>
+              <a:t> </a:t>
+            </a:r>
+            <a:r>
+              <a:rPr lang="en-US" dirty="0" err="1" smtClean="0"/>
+              <a:t>hanya</a:t>
+            </a:r>
+            <a:r>
+              <a:rPr lang="en-US" dirty="0" smtClean="0"/>
+              <a:t> </a:t>
+            </a:r>
+            <a:r>
+              <a:rPr lang="en-US" dirty="0" err="1" smtClean="0"/>
+              <a:t>terdapat</a:t>
+            </a:r>
+            <a:r>
+              <a:rPr lang="en-US" dirty="0" smtClean="0"/>
+              <a:t> 2 </a:t>
+            </a:r>
+            <a:r>
+              <a:rPr lang="en-US" dirty="0" err="1" smtClean="0"/>
+              <a:t>buah</a:t>
+            </a:r>
+            <a:endParaRPr lang="en-US" dirty="0" smtClean="0"/>
+          </a:p>
+          <a:p>
+            <a:pPr marL="457200" indent="-457200">
+              <a:buFont typeface="+mj-lt"/>
+              <a:buAutoNum type="arabicPeriod"/>
+            </a:pPr>
+            <a:r>
+              <a:rPr lang="en-US" dirty="0" smtClean="0"/>
+              <a:t>Deployment yang </a:t>
+            </a:r>
+            <a:r>
+              <a:rPr lang="en-US" dirty="0" err="1" smtClean="0"/>
+              <a:t>dilakukan</a:t>
+            </a:r>
+            <a:r>
+              <a:rPr lang="en-US" dirty="0" smtClean="0"/>
+              <a:t> </a:t>
+            </a:r>
+            <a:r>
+              <a:rPr lang="en-US" dirty="0" err="1" smtClean="0"/>
+              <a:t>dalam</a:t>
+            </a:r>
+            <a:r>
+              <a:rPr lang="en-US" dirty="0" smtClean="0"/>
+              <a:t> server local (</a:t>
+            </a:r>
+            <a:r>
+              <a:rPr lang="en-US" dirty="0" err="1" smtClean="0"/>
+              <a:t>komputer</a:t>
+            </a:r>
+            <a:r>
+              <a:rPr lang="en-US" dirty="0" smtClean="0"/>
+              <a:t> </a:t>
+            </a:r>
+            <a:r>
+              <a:rPr lang="en-US" dirty="0" err="1" smtClean="0"/>
+              <a:t>pribadi</a:t>
+            </a:r>
+            <a:r>
+              <a:rPr lang="en-US" dirty="0" smtClean="0"/>
+              <a:t>), </a:t>
+            </a:r>
+            <a:r>
+              <a:rPr lang="en-US" dirty="0" err="1" smtClean="0"/>
+              <a:t>harus</a:t>
+            </a:r>
+            <a:r>
+              <a:rPr lang="en-US" dirty="0" smtClean="0"/>
+              <a:t> </a:t>
+            </a:r>
+            <a:r>
+              <a:rPr lang="en-US" dirty="0" err="1" smtClean="0"/>
+              <a:t>dilakukan</a:t>
+            </a:r>
+            <a:r>
+              <a:rPr lang="en-US" dirty="0" smtClean="0"/>
+              <a:t> </a:t>
+            </a:r>
+            <a:r>
+              <a:rPr lang="en-US" dirty="0" err="1" smtClean="0"/>
+              <a:t>dibawah</a:t>
+            </a:r>
+            <a:r>
+              <a:rPr lang="en-US" dirty="0" smtClean="0"/>
+              <a:t> 1 </a:t>
+            </a:r>
+            <a:r>
+              <a:rPr lang="en-US" dirty="0" err="1" smtClean="0"/>
+              <a:t>jaringan</a:t>
+            </a:r>
+            <a:r>
+              <a:rPr lang="en-US" dirty="0" smtClean="0"/>
+              <a:t> yang </a:t>
+            </a:r>
+            <a:r>
+              <a:rPr lang="en-US" dirty="0" err="1" smtClean="0"/>
+              <a:t>sama</a:t>
+            </a:r>
+            <a:r>
+              <a:rPr lang="en-US" dirty="0" smtClean="0"/>
+              <a:t>.</a:t>
+            </a:r>
+          </a:p>
+        </p:txBody>
+      </p:sp>
+    </p:spTree>
+    <p:extLst>
+      <p:ext uri="{BB962C8B-B14F-4D97-AF65-F5344CB8AC3E}">
+        <p14:creationId xmlns:p14="http://schemas.microsoft.com/office/powerpoint/2010/main" val="1721983042"/>
+      </p:ext>
+    </p:extLst>
+  </p:cSld>
+  <p:clrMapOvr>
+    <a:masterClrMapping/>
+  </p:clrMapOvr>
+</p:sld>
+</file>
+
+<file path=ppt/slides/slide36.xml><?xml version="1.0" encoding="utf-8"?>
+<p:sld xmlns:a="http://schemas.openxmlformats.org/drawingml/2006/main" xmlns:r="http://schemas.openxmlformats.org/officeDocument/2006/relationships" xmlns:p="http://schemas.openxmlformats.org/presentationml/2006/main">
+  <p:cSld>
+    <p:spTree>
+      <p:nvGrpSpPr>
+        <p:cNvPr id="1" name=""/>
+        <p:cNvGrpSpPr/>
+        <p:nvPr/>
+      </p:nvGrpSpPr>
+      <p:grpSpPr>
+        <a:xfrm>
+          <a:off x="0" y="0"/>
+          <a:ext cx="0" cy="0"/>
+          <a:chOff x="0" y="0"/>
+          <a:chExt cx="0" cy="0"/>
+        </a:xfrm>
+      </p:grpSpPr>
+      <p:sp>
+        <p:nvSpPr>
+          <p:cNvPr id="2" name="Title 1"/>
+          <p:cNvSpPr>
+            <a:spLocks noGrp="1"/>
+          </p:cNvSpPr>
+          <p:nvPr>
+            <p:ph type="title"/>
+          </p:nvPr>
+        </p:nvSpPr>
+        <p:spPr/>
+        <p:txBody>
+          <a:bodyPr/>
+          <a:lstStyle/>
+          <a:p>
+            <a:r>
+              <a:rPr lang="en-US" dirty="0" err="1" smtClean="0"/>
               <a:t>Lingkunan</a:t>
             </a:r>
             <a:r>
@@ -27368,6 +28360,98 @@
     <p:extLst>
       <p:ext uri="{BB962C8B-B14F-4D97-AF65-F5344CB8AC3E}">
         <p14:creationId xmlns:p14="http://schemas.microsoft.com/office/powerpoint/2010/main" val="1013552250"/>
+      </p:ext>
+    </p:extLst>
+  </p:cSld>
+  <p:clrMapOvr>
+    <a:masterClrMapping/>
+  </p:clrMapOvr>
+</p:sld>
+</file>
+
+<file path=ppt/slides/slide37.xml><?xml version="1.0" encoding="utf-8"?>
+<p:sld xmlns:a="http://schemas.openxmlformats.org/drawingml/2006/main" xmlns:r="http://schemas.openxmlformats.org/officeDocument/2006/relationships" xmlns:p="http://schemas.openxmlformats.org/presentationml/2006/main">
+  <p:cSld>
+    <p:spTree>
+      <p:nvGrpSpPr>
+        <p:cNvPr id="1" name=""/>
+        <p:cNvGrpSpPr/>
+        <p:nvPr/>
+      </p:nvGrpSpPr>
+      <p:grpSpPr>
+        <a:xfrm>
+          <a:off x="0" y="0"/>
+          <a:ext cx="0" cy="0"/>
+          <a:chOff x="0" y="0"/>
+          <a:chExt cx="0" cy="0"/>
+        </a:xfrm>
+      </p:grpSpPr>
+      <p:sp>
+        <p:nvSpPr>
+          <p:cNvPr id="2" name="Title 1"/>
+          <p:cNvSpPr>
+            <a:spLocks noGrp="1"/>
+          </p:cNvSpPr>
+          <p:nvPr>
+            <p:ph type="title"/>
+          </p:nvPr>
+        </p:nvSpPr>
+        <p:spPr/>
+        <p:txBody>
+          <a:bodyPr/>
+          <a:lstStyle/>
+          <a:p>
+            <a:r>
+              <a:rPr lang="en-US" dirty="0" smtClean="0"/>
+              <a:t>4. </a:t>
+            </a:r>
+            <a:r>
+              <a:rPr lang="en-US" dirty="0" err="1" smtClean="0"/>
+              <a:t>Implementasi</a:t>
+            </a:r>
+            <a:r>
+              <a:rPr lang="en-US" dirty="0" smtClean="0"/>
+              <a:t> </a:t>
+            </a:r>
+            <a:r>
+              <a:rPr lang="en-US" dirty="0" err="1" smtClean="0"/>
+              <a:t>dan</a:t>
+            </a:r>
+            <a:r>
+              <a:rPr lang="en-US" dirty="0" smtClean="0"/>
+              <a:t> </a:t>
+            </a:r>
+            <a:r>
+              <a:rPr lang="en-US" dirty="0" err="1" smtClean="0"/>
+              <a:t>pengujian</a:t>
+            </a:r>
+            <a:endParaRPr lang="en-US" dirty="0"/>
+          </a:p>
+        </p:txBody>
+      </p:sp>
+      <p:sp>
+        <p:nvSpPr>
+          <p:cNvPr id="3" name="Content Placeholder 2"/>
+          <p:cNvSpPr>
+            <a:spLocks noGrp="1"/>
+          </p:cNvSpPr>
+          <p:nvPr>
+            <p:ph idx="1"/>
+          </p:nvPr>
+        </p:nvSpPr>
+        <p:spPr/>
+        <p:txBody>
+          <a:bodyPr/>
+          <a:lstStyle/>
+          <a:p>
+            <a:endParaRPr lang="en-US"/>
+          </a:p>
+        </p:txBody>
+      </p:sp>
+    </p:spTree>
+    <p:extLst>
+      <p:ext uri="{BB962C8B-B14F-4D97-AF65-F5344CB8AC3E}">
+        <p14:creationId xmlns:p14="http://schemas.microsoft.com/office/powerpoint/2010/main" val="1148575744"/>
       </p:ext>
     </p:extLst>
   </p:cSld>
@@ -27460,7 +28544,9 @@
         </p:nvSpPr>
         <p:spPr/>
         <p:txBody>
-          <a:bodyPr/>
+          <a:bodyPr>
+            <a:normAutofit/>
+          </a:bodyPr>
           <a:lstStyle/>
           <a:p>
             <a:pPr>
@@ -27480,27 +28566,35 @@
               <a:t> </a:t>
             </a:r>
             <a:r>
-              <a:rPr lang="en-US" dirty="0" err="1"/>
-              <a:t>tahapan</a:t>
-            </a:r>
-            <a:r>
-              <a:rPr lang="en-US" dirty="0"/>
-              <a:t> </a:t>
-            </a:r>
-            <a:r>
-              <a:rPr lang="en-US" dirty="0" err="1"/>
+              <a:rPr lang="en-US" dirty="0" err="1" smtClean="0"/>
+              <a:t>tahap</a:t>
+            </a:r>
+            <a:r>
+              <a:rPr lang="en-US" dirty="0" smtClean="0"/>
+              <a:t> </a:t>
+            </a:r>
+            <a:r>
+              <a:rPr lang="en-US" dirty="0" err="1" smtClean="0"/>
               <a:t>migrasi</a:t>
             </a:r>
             <a:r>
-              <a:rPr lang="en-US" dirty="0"/>
-              <a:t> </a:t>
-            </a:r>
-            <a:r>
-              <a:rPr lang="en-US" dirty="0" err="1"/>
+              <a:rPr lang="en-US" dirty="0" smtClean="0"/>
+              <a:t> yang </a:t>
+            </a:r>
+            <a:r>
+              <a:rPr lang="en-US" dirty="0" err="1" smtClean="0"/>
+              <a:t>benar</a:t>
+            </a:r>
+            <a:r>
+              <a:rPr lang="en-US" dirty="0" smtClean="0"/>
+              <a:t> </a:t>
+            </a:r>
+            <a:r>
+              <a:rPr lang="en-US" dirty="0" err="1" smtClean="0"/>
               <a:t>dari</a:t>
             </a:r>
             <a:r>
-              <a:rPr lang="en-US" dirty="0"/>
+              <a:rPr lang="en-US" dirty="0" smtClean="0"/>
               <a:t> </a:t>
             </a:r>
             <a:r>
@@ -27532,7 +28626,7 @@
               <a:t>microservice</a:t>
             </a:r>
             <a:r>
-              <a:rPr lang="en-US" dirty="0"/>
+              <a:rPr lang="en-US" dirty="0" smtClean="0"/>
               <a:t>.</a:t>
             </a:r>
           </a:p>
@@ -27542,97 +28636,66 @@
               <a:buChar char="•"/>
             </a:pPr>
             <a:r>
-              <a:rPr lang="en-US" dirty="0" smtClean="0"/>
-              <a:t> </a:t>
-            </a:r>
-            <a:r>
-              <a:rPr lang="en-US" dirty="0" err="1" smtClean="0"/>
-              <a:t>Menunjukan</a:t>
-            </a:r>
-            <a:r>
-              <a:rPr lang="en-US" dirty="0" smtClean="0"/>
-              <a:t> </a:t>
-            </a:r>
-            <a:r>
-              <a:rPr lang="en-US" dirty="0" err="1"/>
-              <a:t>bahwa</a:t>
-            </a:r>
-            <a:r>
               <a:rPr lang="en-US" dirty="0"/>
               <a:t> </a:t>
             </a:r>
             <a:r>
-              <a:rPr lang="en-US" dirty="0" err="1"/>
+              <a:rPr lang="en-US" dirty="0" err="1" smtClean="0"/>
+              <a:t>Membandingkan</a:t>
+            </a:r>
+            <a:r>
+              <a:rPr lang="en-US" dirty="0" smtClean="0"/>
+              <a:t> </a:t>
+            </a:r>
+            <a:r>
+              <a:rPr lang="en-US" dirty="0" err="1" smtClean="0"/>
               <a:t>performa</a:t>
             </a:r>
             <a:r>
-              <a:rPr lang="en-US" dirty="0"/>
-              <a:t> yang </a:t>
-            </a:r>
-            <a:r>
-              <a:rPr lang="en-US" dirty="0" err="1"/>
-              <a:t>dihasilkan</a:t>
-            </a:r>
-            <a:r>
-              <a:rPr lang="en-US" dirty="0"/>
-              <a:t> </a:t>
-            </a:r>
-            <a:r>
-              <a:rPr lang="en-US" dirty="0" err="1"/>
+              <a:rPr lang="en-US" dirty="0" smtClean="0"/>
+              <a:t> </a:t>
+            </a:r>
+            <a:r>
+              <a:rPr lang="en-US" dirty="0" err="1" smtClean="0"/>
+              <a:t>antara</a:t>
+            </a:r>
+            <a:r>
+              <a:rPr lang="en-US" dirty="0" smtClean="0"/>
+              <a:t> </a:t>
+            </a:r>
+            <a:r>
+              <a:rPr lang="en-US" dirty="0" err="1" smtClean="0"/>
               <a:t>arsitektur</a:t>
             </a:r>
             <a:r>
-              <a:rPr lang="en-US" dirty="0"/>
-              <a:t> </a:t>
-            </a:r>
-            <a:r>
-              <a:rPr lang="en-US" dirty="0" err="1"/>
-              <a:t>baru</a:t>
-            </a:r>
-            <a:r>
-              <a:rPr lang="en-US" dirty="0"/>
-              <a:t> </a:t>
-            </a:r>
-            <a:r>
-              <a:rPr lang="en-US" dirty="0" err="1"/>
-              <a:t>akan</a:t>
-            </a:r>
-            <a:r>
-              <a:rPr lang="en-US" dirty="0"/>
-              <a:t> </a:t>
-            </a:r>
-            <a:r>
-              <a:rPr lang="en-US" dirty="0" err="1"/>
-              <a:t>jauh</a:t>
-            </a:r>
-            <a:r>
-              <a:rPr lang="en-US" dirty="0"/>
-              <a:t> </a:t>
-            </a:r>
-            <a:r>
-              <a:rPr lang="en-US" dirty="0" err="1"/>
-              <a:t>melebihi</a:t>
-            </a:r>
-            <a:r>
-              <a:rPr lang="en-US" dirty="0"/>
-              <a:t> </a:t>
-            </a:r>
-            <a:r>
-              <a:rPr lang="en-US" dirty="0" err="1"/>
-              <a:t>arsitektur</a:t>
-            </a:r>
-            <a:r>
-              <a:rPr lang="en-US" dirty="0"/>
-              <a:t> </a:t>
-            </a:r>
-            <a:r>
-              <a:rPr lang="en-US" dirty="0" err="1"/>
-              <a:t>konvensional</a:t>
-            </a:r>
-            <a:r>
-              <a:rPr lang="en-US" dirty="0"/>
+              <a:rPr lang="en-US" dirty="0" smtClean="0"/>
+              <a:t> </a:t>
+            </a:r>
+            <a:r>
+              <a:rPr lang="en-US" dirty="0" err="1" smtClean="0"/>
+              <a:t>microservice</a:t>
+            </a:r>
+            <a:r>
+              <a:rPr lang="en-US" dirty="0" smtClean="0"/>
+              <a:t> </a:t>
+            </a:r>
+            <a:r>
+              <a:rPr lang="en-US" dirty="0" err="1" smtClean="0"/>
+              <a:t>dan</a:t>
+            </a:r>
+            <a:r>
+              <a:rPr lang="en-US" dirty="0" smtClean="0"/>
+              <a:t> </a:t>
+            </a:r>
+            <a:r>
+              <a:rPr lang="en-US" dirty="0" err="1" smtClean="0"/>
+              <a:t>monolitik</a:t>
+            </a:r>
+            <a:r>
+              <a:rPr lang="en-US" dirty="0" smtClean="0"/>
               <a:t>.</a:t>
             </a:r>
+            <a:endParaRPr lang="en-US" dirty="0"/>
           </a:p>
           <a:p>
             <a:pPr>
@@ -28087,6 +29150,10 @@
               <a:buFont typeface="Arial" panose="020B0604020202020204" pitchFamily="34" charset="0"/>
               <a:buChar char="•"/>
             </a:pPr>
+            <a:r>
+              <a:rPr lang="en-US" dirty="0" smtClean="0"/>
+              <a:t> </a:t>
+            </a:r>
             <a:r>
               <a:rPr lang="en-US" dirty="0" err="1" smtClean="0"/>
               <a:t>Arsitektur</a:t>

</xml_diff>